<commit_message>
Comparing to openCV mog algorithm
</commit_message>
<xml_diff>
--- a/01_doc/presentation.pptx
+++ b/01_doc/presentation.pptx
@@ -12,10 +12,11 @@
     <p:sldId id="267" r:id="rId6"/>
     <p:sldId id="258" r:id="rId7"/>
     <p:sldId id="259" r:id="rId8"/>
-    <p:sldId id="270" r:id="rId9"/>
-    <p:sldId id="260" r:id="rId10"/>
-    <p:sldId id="261" r:id="rId11"/>
-    <p:sldId id="265" r:id="rId12"/>
+    <p:sldId id="260" r:id="rId9"/>
+    <p:sldId id="270" r:id="rId10"/>
+    <p:sldId id="271" r:id="rId11"/>
+    <p:sldId id="261" r:id="rId12"/>
+    <p:sldId id="265" r:id="rId13"/>
   </p:sldIdLst>
   <p:sldSz cx="12192000" cy="6858000"/>
   <p:notesSz cx="6858000" cy="9144000"/>
@@ -8032,6 +8033,2143 @@
 </c:chartSpace>
 </file>
 
+<file path=ppt/charts/chart2.xml><?xml version="1.0" encoding="utf-8"?>
+<c:chartSpace xmlns:c="http://schemas.openxmlformats.org/drawingml/2006/chart" xmlns:a="http://schemas.openxmlformats.org/drawingml/2006/main" xmlns:r="http://schemas.openxmlformats.org/officeDocument/2006/relationships" xmlns:c16r2="http://schemas.microsoft.com/office/drawing/2015/06/chart">
+  <c:date1904 val="0"/>
+  <c:lang val="hu-HU"/>
+  <c:roundedCorners val="0"/>
+  <mc:AlternateContent xmlns:mc="http://schemas.openxmlformats.org/markup-compatibility/2006">
+    <mc:Choice xmlns:c14="http://schemas.microsoft.com/office/drawing/2007/8/2/chart" Requires="c14">
+      <c14:style val="102"/>
+    </mc:Choice>
+    <mc:Fallback>
+      <c:style val="2"/>
+    </mc:Fallback>
+  </mc:AlternateContent>
+  <c:chart>
+    <c:title>
+      <c:layout/>
+      <c:overlay val="0"/>
+      <c:spPr>
+        <a:noFill/>
+        <a:ln>
+          <a:noFill/>
+        </a:ln>
+        <a:effectLst/>
+      </c:spPr>
+      <c:txPr>
+        <a:bodyPr rot="0" spcFirstLastPara="1" vertOverflow="ellipsis" vert="horz" wrap="square" anchor="ctr" anchorCtr="1"/>
+        <a:lstStyle/>
+        <a:p>
+          <a:pPr>
+            <a:defRPr sz="1600" b="1" i="0" u="none" strike="noStrike" kern="1200" spc="100" baseline="0">
+              <a:solidFill>
+                <a:schemeClr val="lt1">
+                  <a:lumMod val="95000"/>
+                </a:schemeClr>
+              </a:solidFill>
+              <a:effectLst>
+                <a:outerShdw blurRad="50800" dist="38100" dir="5400000" algn="t" rotWithShape="0">
+                  <a:prstClr val="black">
+                    <a:alpha val="40000"/>
+                  </a:prstClr>
+                </a:outerShdw>
+              </a:effectLst>
+              <a:latin typeface="+mn-lt"/>
+              <a:ea typeface="+mn-ea"/>
+              <a:cs typeface="+mn-cs"/>
+            </a:defRPr>
+          </a:pPr>
+          <a:endParaRPr lang="hu-HU"/>
+        </a:p>
+      </c:txPr>
+    </c:title>
+    <c:autoTitleDeleted val="0"/>
+    <c:plotArea>
+      <c:layout/>
+      <c:scatterChart>
+        <c:scatterStyle val="lineMarker"/>
+        <c:varyColors val="0"/>
+        <c:ser>
+          <c:idx val="0"/>
+          <c:order val="0"/>
+          <c:tx>
+            <c:strRef>
+              <c:f>comparating!$E$1</c:f>
+              <c:strCache>
+                <c:ptCount val="1"/>
+                <c:pt idx="0">
+                  <c:v>Ratio</c:v>
+                </c:pt>
+              </c:strCache>
+            </c:strRef>
+          </c:tx>
+          <c:spPr>
+            <a:ln w="25400" cap="rnd">
+              <a:noFill/>
+              <a:round/>
+            </a:ln>
+            <a:effectLst>
+              <a:outerShdw blurRad="57150" dist="19050" dir="5400000" algn="ctr" rotWithShape="0">
+                <a:srgbClr val="000000">
+                  <a:alpha val="63000"/>
+                </a:srgbClr>
+              </a:outerShdw>
+            </a:effectLst>
+          </c:spPr>
+          <c:marker>
+            <c:symbol val="circle"/>
+            <c:size val="6"/>
+            <c:spPr>
+              <a:gradFill rotWithShape="1">
+                <a:gsLst>
+                  <a:gs pos="0">
+                    <a:schemeClr val="accent1">
+                      <a:satMod val="103000"/>
+                      <a:lumMod val="102000"/>
+                      <a:tint val="94000"/>
+                    </a:schemeClr>
+                  </a:gs>
+                  <a:gs pos="50000">
+                    <a:schemeClr val="accent1">
+                      <a:satMod val="110000"/>
+                      <a:lumMod val="100000"/>
+                      <a:shade val="100000"/>
+                    </a:schemeClr>
+                  </a:gs>
+                  <a:gs pos="100000">
+                    <a:schemeClr val="accent1">
+                      <a:lumMod val="99000"/>
+                      <a:satMod val="120000"/>
+                      <a:shade val="78000"/>
+                    </a:schemeClr>
+                  </a:gs>
+                </a:gsLst>
+                <a:lin ang="5400000" scaled="0"/>
+              </a:gradFill>
+              <a:ln w="9525" cap="rnd">
+                <a:solidFill>
+                  <a:schemeClr val="accent1"/>
+                </a:solidFill>
+                <a:round/>
+              </a:ln>
+              <a:effectLst>
+                <a:outerShdw blurRad="57150" dist="19050" dir="5400000" algn="ctr" rotWithShape="0">
+                  <a:srgbClr val="000000">
+                    <a:alpha val="63000"/>
+                  </a:srgbClr>
+                </a:outerShdw>
+              </a:effectLst>
+            </c:spPr>
+          </c:marker>
+          <c:xVal>
+            <c:numRef>
+              <c:f>comparating!$A$2:$A$301</c:f>
+              <c:numCache>
+                <c:formatCode>General</c:formatCode>
+                <c:ptCount val="300"/>
+                <c:pt idx="0">
+                  <c:v>69120</c:v>
+                </c:pt>
+                <c:pt idx="1">
+                  <c:v>138240</c:v>
+                </c:pt>
+                <c:pt idx="2">
+                  <c:v>207360</c:v>
+                </c:pt>
+                <c:pt idx="3">
+                  <c:v>276480</c:v>
+                </c:pt>
+                <c:pt idx="4">
+                  <c:v>345600</c:v>
+                </c:pt>
+                <c:pt idx="5">
+                  <c:v>414720</c:v>
+                </c:pt>
+                <c:pt idx="6">
+                  <c:v>483840</c:v>
+                </c:pt>
+                <c:pt idx="7">
+                  <c:v>552960</c:v>
+                </c:pt>
+                <c:pt idx="8">
+                  <c:v>622080</c:v>
+                </c:pt>
+                <c:pt idx="9">
+                  <c:v>691200</c:v>
+                </c:pt>
+                <c:pt idx="10">
+                  <c:v>760320</c:v>
+                </c:pt>
+                <c:pt idx="11">
+                  <c:v>829440</c:v>
+                </c:pt>
+                <c:pt idx="12">
+                  <c:v>898560</c:v>
+                </c:pt>
+                <c:pt idx="13">
+                  <c:v>967680</c:v>
+                </c:pt>
+                <c:pt idx="14">
+                  <c:v>1036800</c:v>
+                </c:pt>
+                <c:pt idx="15">
+                  <c:v>1105920</c:v>
+                </c:pt>
+                <c:pt idx="16">
+                  <c:v>1175040</c:v>
+                </c:pt>
+                <c:pt idx="17">
+                  <c:v>1244160</c:v>
+                </c:pt>
+                <c:pt idx="18">
+                  <c:v>1313280</c:v>
+                </c:pt>
+                <c:pt idx="19">
+                  <c:v>1382400</c:v>
+                </c:pt>
+                <c:pt idx="20">
+                  <c:v>1451520</c:v>
+                </c:pt>
+                <c:pt idx="21">
+                  <c:v>1520640</c:v>
+                </c:pt>
+                <c:pt idx="22">
+                  <c:v>1589760</c:v>
+                </c:pt>
+                <c:pt idx="23">
+                  <c:v>1658880</c:v>
+                </c:pt>
+                <c:pt idx="24">
+                  <c:v>1728000</c:v>
+                </c:pt>
+                <c:pt idx="25">
+                  <c:v>1797120</c:v>
+                </c:pt>
+                <c:pt idx="26">
+                  <c:v>1866240</c:v>
+                </c:pt>
+                <c:pt idx="27">
+                  <c:v>1935360</c:v>
+                </c:pt>
+                <c:pt idx="28">
+                  <c:v>2004480</c:v>
+                </c:pt>
+                <c:pt idx="29">
+                  <c:v>2073600</c:v>
+                </c:pt>
+                <c:pt idx="30">
+                  <c:v>2142720</c:v>
+                </c:pt>
+                <c:pt idx="31">
+                  <c:v>2211840</c:v>
+                </c:pt>
+                <c:pt idx="32">
+                  <c:v>2280960</c:v>
+                </c:pt>
+                <c:pt idx="33">
+                  <c:v>2350080</c:v>
+                </c:pt>
+                <c:pt idx="34">
+                  <c:v>2419200</c:v>
+                </c:pt>
+                <c:pt idx="35">
+                  <c:v>2488320</c:v>
+                </c:pt>
+                <c:pt idx="36">
+                  <c:v>2557440</c:v>
+                </c:pt>
+                <c:pt idx="37">
+                  <c:v>2626560</c:v>
+                </c:pt>
+                <c:pt idx="38">
+                  <c:v>2695680</c:v>
+                </c:pt>
+                <c:pt idx="39">
+                  <c:v>2764800</c:v>
+                </c:pt>
+                <c:pt idx="40">
+                  <c:v>2833920</c:v>
+                </c:pt>
+                <c:pt idx="41">
+                  <c:v>2903040</c:v>
+                </c:pt>
+                <c:pt idx="42">
+                  <c:v>2972160</c:v>
+                </c:pt>
+                <c:pt idx="43">
+                  <c:v>3041280</c:v>
+                </c:pt>
+                <c:pt idx="44">
+                  <c:v>3110400</c:v>
+                </c:pt>
+                <c:pt idx="45">
+                  <c:v>3179520</c:v>
+                </c:pt>
+                <c:pt idx="46">
+                  <c:v>3248640</c:v>
+                </c:pt>
+                <c:pt idx="47">
+                  <c:v>3317760</c:v>
+                </c:pt>
+                <c:pt idx="48">
+                  <c:v>3386880</c:v>
+                </c:pt>
+                <c:pt idx="49">
+                  <c:v>3456000</c:v>
+                </c:pt>
+                <c:pt idx="50">
+                  <c:v>3525120</c:v>
+                </c:pt>
+                <c:pt idx="51">
+                  <c:v>3594240</c:v>
+                </c:pt>
+                <c:pt idx="52">
+                  <c:v>3663360</c:v>
+                </c:pt>
+                <c:pt idx="53">
+                  <c:v>3732480</c:v>
+                </c:pt>
+                <c:pt idx="54">
+                  <c:v>3801600</c:v>
+                </c:pt>
+                <c:pt idx="55">
+                  <c:v>3870720</c:v>
+                </c:pt>
+                <c:pt idx="56">
+                  <c:v>3939840</c:v>
+                </c:pt>
+                <c:pt idx="57">
+                  <c:v>4008960</c:v>
+                </c:pt>
+                <c:pt idx="58">
+                  <c:v>4078080</c:v>
+                </c:pt>
+                <c:pt idx="59">
+                  <c:v>0</c:v>
+                </c:pt>
+                <c:pt idx="60">
+                  <c:v>69120</c:v>
+                </c:pt>
+                <c:pt idx="61">
+                  <c:v>138240</c:v>
+                </c:pt>
+                <c:pt idx="62">
+                  <c:v>207360</c:v>
+                </c:pt>
+                <c:pt idx="63">
+                  <c:v>276480</c:v>
+                </c:pt>
+                <c:pt idx="64">
+                  <c:v>345600</c:v>
+                </c:pt>
+                <c:pt idx="65">
+                  <c:v>414720</c:v>
+                </c:pt>
+                <c:pt idx="66">
+                  <c:v>483840</c:v>
+                </c:pt>
+                <c:pt idx="67">
+                  <c:v>552960</c:v>
+                </c:pt>
+                <c:pt idx="68">
+                  <c:v>622080</c:v>
+                </c:pt>
+                <c:pt idx="69">
+                  <c:v>691200</c:v>
+                </c:pt>
+                <c:pt idx="70">
+                  <c:v>760320</c:v>
+                </c:pt>
+                <c:pt idx="71">
+                  <c:v>829440</c:v>
+                </c:pt>
+                <c:pt idx="72">
+                  <c:v>898560</c:v>
+                </c:pt>
+                <c:pt idx="73">
+                  <c:v>967680</c:v>
+                </c:pt>
+                <c:pt idx="74">
+                  <c:v>1036800</c:v>
+                </c:pt>
+                <c:pt idx="75">
+                  <c:v>1105920</c:v>
+                </c:pt>
+                <c:pt idx="76">
+                  <c:v>1175040</c:v>
+                </c:pt>
+                <c:pt idx="77">
+                  <c:v>1244160</c:v>
+                </c:pt>
+                <c:pt idx="78">
+                  <c:v>1313280</c:v>
+                </c:pt>
+                <c:pt idx="79">
+                  <c:v>1382400</c:v>
+                </c:pt>
+                <c:pt idx="80">
+                  <c:v>1451520</c:v>
+                </c:pt>
+                <c:pt idx="81">
+                  <c:v>1520640</c:v>
+                </c:pt>
+                <c:pt idx="82">
+                  <c:v>1589760</c:v>
+                </c:pt>
+                <c:pt idx="83">
+                  <c:v>1658880</c:v>
+                </c:pt>
+                <c:pt idx="84">
+                  <c:v>1728000</c:v>
+                </c:pt>
+                <c:pt idx="85">
+                  <c:v>1797120</c:v>
+                </c:pt>
+                <c:pt idx="86">
+                  <c:v>1866240</c:v>
+                </c:pt>
+                <c:pt idx="87">
+                  <c:v>1935360</c:v>
+                </c:pt>
+                <c:pt idx="88">
+                  <c:v>2004480</c:v>
+                </c:pt>
+                <c:pt idx="89">
+                  <c:v>2073600</c:v>
+                </c:pt>
+                <c:pt idx="90">
+                  <c:v>2142720</c:v>
+                </c:pt>
+                <c:pt idx="91">
+                  <c:v>2211840</c:v>
+                </c:pt>
+                <c:pt idx="92">
+                  <c:v>2280960</c:v>
+                </c:pt>
+                <c:pt idx="93">
+                  <c:v>2350080</c:v>
+                </c:pt>
+                <c:pt idx="94">
+                  <c:v>2419200</c:v>
+                </c:pt>
+                <c:pt idx="95">
+                  <c:v>2488320</c:v>
+                </c:pt>
+                <c:pt idx="96">
+                  <c:v>2557440</c:v>
+                </c:pt>
+                <c:pt idx="97">
+                  <c:v>2626560</c:v>
+                </c:pt>
+                <c:pt idx="98">
+                  <c:v>2695680</c:v>
+                </c:pt>
+                <c:pt idx="99">
+                  <c:v>2764800</c:v>
+                </c:pt>
+                <c:pt idx="100">
+                  <c:v>2833920</c:v>
+                </c:pt>
+                <c:pt idx="101">
+                  <c:v>2903040</c:v>
+                </c:pt>
+                <c:pt idx="102">
+                  <c:v>2972160</c:v>
+                </c:pt>
+                <c:pt idx="103">
+                  <c:v>3041280</c:v>
+                </c:pt>
+                <c:pt idx="104">
+                  <c:v>3110400</c:v>
+                </c:pt>
+                <c:pt idx="105">
+                  <c:v>3179520</c:v>
+                </c:pt>
+                <c:pt idx="106">
+                  <c:v>3248640</c:v>
+                </c:pt>
+                <c:pt idx="107">
+                  <c:v>3317760</c:v>
+                </c:pt>
+                <c:pt idx="108">
+                  <c:v>3386880</c:v>
+                </c:pt>
+                <c:pt idx="109">
+                  <c:v>3456000</c:v>
+                </c:pt>
+                <c:pt idx="110">
+                  <c:v>3525120</c:v>
+                </c:pt>
+                <c:pt idx="111">
+                  <c:v>3594240</c:v>
+                </c:pt>
+                <c:pt idx="112">
+                  <c:v>3663360</c:v>
+                </c:pt>
+                <c:pt idx="113">
+                  <c:v>3732480</c:v>
+                </c:pt>
+                <c:pt idx="114">
+                  <c:v>3801600</c:v>
+                </c:pt>
+                <c:pt idx="115">
+                  <c:v>3870720</c:v>
+                </c:pt>
+                <c:pt idx="116">
+                  <c:v>3939840</c:v>
+                </c:pt>
+                <c:pt idx="117">
+                  <c:v>4008960</c:v>
+                </c:pt>
+                <c:pt idx="118">
+                  <c:v>4078080</c:v>
+                </c:pt>
+                <c:pt idx="119">
+                  <c:v>0</c:v>
+                </c:pt>
+                <c:pt idx="120">
+                  <c:v>69120</c:v>
+                </c:pt>
+                <c:pt idx="121">
+                  <c:v>138240</c:v>
+                </c:pt>
+                <c:pt idx="122">
+                  <c:v>207360</c:v>
+                </c:pt>
+                <c:pt idx="123">
+                  <c:v>276480</c:v>
+                </c:pt>
+                <c:pt idx="124">
+                  <c:v>345600</c:v>
+                </c:pt>
+                <c:pt idx="125">
+                  <c:v>414720</c:v>
+                </c:pt>
+                <c:pt idx="126">
+                  <c:v>483840</c:v>
+                </c:pt>
+                <c:pt idx="127">
+                  <c:v>552960</c:v>
+                </c:pt>
+                <c:pt idx="128">
+                  <c:v>622080</c:v>
+                </c:pt>
+                <c:pt idx="129">
+                  <c:v>691200</c:v>
+                </c:pt>
+                <c:pt idx="130">
+                  <c:v>760320</c:v>
+                </c:pt>
+                <c:pt idx="131">
+                  <c:v>829440</c:v>
+                </c:pt>
+                <c:pt idx="132">
+                  <c:v>898560</c:v>
+                </c:pt>
+                <c:pt idx="133">
+                  <c:v>967680</c:v>
+                </c:pt>
+                <c:pt idx="134">
+                  <c:v>1036800</c:v>
+                </c:pt>
+                <c:pt idx="135">
+                  <c:v>1105920</c:v>
+                </c:pt>
+                <c:pt idx="136">
+                  <c:v>1175040</c:v>
+                </c:pt>
+                <c:pt idx="137">
+                  <c:v>1244160</c:v>
+                </c:pt>
+                <c:pt idx="138">
+                  <c:v>1313280</c:v>
+                </c:pt>
+                <c:pt idx="139">
+                  <c:v>1382400</c:v>
+                </c:pt>
+                <c:pt idx="140">
+                  <c:v>1451520</c:v>
+                </c:pt>
+                <c:pt idx="141">
+                  <c:v>1520640</c:v>
+                </c:pt>
+                <c:pt idx="142">
+                  <c:v>1589760</c:v>
+                </c:pt>
+                <c:pt idx="143">
+                  <c:v>1658880</c:v>
+                </c:pt>
+                <c:pt idx="144">
+                  <c:v>1728000</c:v>
+                </c:pt>
+                <c:pt idx="145">
+                  <c:v>1797120</c:v>
+                </c:pt>
+                <c:pt idx="146">
+                  <c:v>1866240</c:v>
+                </c:pt>
+                <c:pt idx="147">
+                  <c:v>1935360</c:v>
+                </c:pt>
+                <c:pt idx="148">
+                  <c:v>2004480</c:v>
+                </c:pt>
+                <c:pt idx="149">
+                  <c:v>2073600</c:v>
+                </c:pt>
+                <c:pt idx="150">
+                  <c:v>2142720</c:v>
+                </c:pt>
+                <c:pt idx="151">
+                  <c:v>2211840</c:v>
+                </c:pt>
+                <c:pt idx="152">
+                  <c:v>2280960</c:v>
+                </c:pt>
+                <c:pt idx="153">
+                  <c:v>2350080</c:v>
+                </c:pt>
+                <c:pt idx="154">
+                  <c:v>2419200</c:v>
+                </c:pt>
+                <c:pt idx="155">
+                  <c:v>2488320</c:v>
+                </c:pt>
+                <c:pt idx="156">
+                  <c:v>2557440</c:v>
+                </c:pt>
+                <c:pt idx="157">
+                  <c:v>2626560</c:v>
+                </c:pt>
+                <c:pt idx="158">
+                  <c:v>2695680</c:v>
+                </c:pt>
+                <c:pt idx="159">
+                  <c:v>2764800</c:v>
+                </c:pt>
+                <c:pt idx="160">
+                  <c:v>2833920</c:v>
+                </c:pt>
+                <c:pt idx="161">
+                  <c:v>2903040</c:v>
+                </c:pt>
+                <c:pt idx="162">
+                  <c:v>2972160</c:v>
+                </c:pt>
+                <c:pt idx="163">
+                  <c:v>3041280</c:v>
+                </c:pt>
+                <c:pt idx="164">
+                  <c:v>3110400</c:v>
+                </c:pt>
+                <c:pt idx="165">
+                  <c:v>3179520</c:v>
+                </c:pt>
+                <c:pt idx="166">
+                  <c:v>3248640</c:v>
+                </c:pt>
+                <c:pt idx="167">
+                  <c:v>3317760</c:v>
+                </c:pt>
+                <c:pt idx="168">
+                  <c:v>3386880</c:v>
+                </c:pt>
+                <c:pt idx="169">
+                  <c:v>3456000</c:v>
+                </c:pt>
+                <c:pt idx="170">
+                  <c:v>3525120</c:v>
+                </c:pt>
+                <c:pt idx="171">
+                  <c:v>3594240</c:v>
+                </c:pt>
+                <c:pt idx="172">
+                  <c:v>3663360</c:v>
+                </c:pt>
+                <c:pt idx="173">
+                  <c:v>3732480</c:v>
+                </c:pt>
+                <c:pt idx="174">
+                  <c:v>3801600</c:v>
+                </c:pt>
+                <c:pt idx="175">
+                  <c:v>3870720</c:v>
+                </c:pt>
+                <c:pt idx="176">
+                  <c:v>3939840</c:v>
+                </c:pt>
+                <c:pt idx="177">
+                  <c:v>4008960</c:v>
+                </c:pt>
+                <c:pt idx="178">
+                  <c:v>4078080</c:v>
+                </c:pt>
+                <c:pt idx="179">
+                  <c:v>0</c:v>
+                </c:pt>
+                <c:pt idx="180">
+                  <c:v>69120</c:v>
+                </c:pt>
+                <c:pt idx="181">
+                  <c:v>138240</c:v>
+                </c:pt>
+                <c:pt idx="182">
+                  <c:v>207360</c:v>
+                </c:pt>
+                <c:pt idx="183">
+                  <c:v>276480</c:v>
+                </c:pt>
+                <c:pt idx="184">
+                  <c:v>345600</c:v>
+                </c:pt>
+                <c:pt idx="185">
+                  <c:v>414720</c:v>
+                </c:pt>
+                <c:pt idx="186">
+                  <c:v>483840</c:v>
+                </c:pt>
+                <c:pt idx="187">
+                  <c:v>552960</c:v>
+                </c:pt>
+                <c:pt idx="188">
+                  <c:v>622080</c:v>
+                </c:pt>
+                <c:pt idx="189">
+                  <c:v>691200</c:v>
+                </c:pt>
+                <c:pt idx="190">
+                  <c:v>760320</c:v>
+                </c:pt>
+                <c:pt idx="191">
+                  <c:v>829440</c:v>
+                </c:pt>
+                <c:pt idx="192">
+                  <c:v>898560</c:v>
+                </c:pt>
+                <c:pt idx="193">
+                  <c:v>967680</c:v>
+                </c:pt>
+                <c:pt idx="194">
+                  <c:v>1036800</c:v>
+                </c:pt>
+                <c:pt idx="195">
+                  <c:v>1105920</c:v>
+                </c:pt>
+                <c:pt idx="196">
+                  <c:v>1175040</c:v>
+                </c:pt>
+                <c:pt idx="197">
+                  <c:v>1244160</c:v>
+                </c:pt>
+                <c:pt idx="198">
+                  <c:v>1313280</c:v>
+                </c:pt>
+                <c:pt idx="199">
+                  <c:v>1382400</c:v>
+                </c:pt>
+                <c:pt idx="200">
+                  <c:v>1451520</c:v>
+                </c:pt>
+                <c:pt idx="201">
+                  <c:v>1520640</c:v>
+                </c:pt>
+                <c:pt idx="202">
+                  <c:v>1589760</c:v>
+                </c:pt>
+                <c:pt idx="203">
+                  <c:v>1658880</c:v>
+                </c:pt>
+                <c:pt idx="204">
+                  <c:v>1728000</c:v>
+                </c:pt>
+                <c:pt idx="205">
+                  <c:v>1797120</c:v>
+                </c:pt>
+                <c:pt idx="206">
+                  <c:v>1866240</c:v>
+                </c:pt>
+                <c:pt idx="207">
+                  <c:v>1935360</c:v>
+                </c:pt>
+                <c:pt idx="208">
+                  <c:v>2004480</c:v>
+                </c:pt>
+                <c:pt idx="209">
+                  <c:v>2073600</c:v>
+                </c:pt>
+                <c:pt idx="210">
+                  <c:v>2142720</c:v>
+                </c:pt>
+                <c:pt idx="211">
+                  <c:v>2211840</c:v>
+                </c:pt>
+                <c:pt idx="212">
+                  <c:v>2280960</c:v>
+                </c:pt>
+                <c:pt idx="213">
+                  <c:v>2350080</c:v>
+                </c:pt>
+                <c:pt idx="214">
+                  <c:v>2419200</c:v>
+                </c:pt>
+                <c:pt idx="215">
+                  <c:v>2488320</c:v>
+                </c:pt>
+                <c:pt idx="216">
+                  <c:v>2557440</c:v>
+                </c:pt>
+                <c:pt idx="217">
+                  <c:v>2626560</c:v>
+                </c:pt>
+                <c:pt idx="218">
+                  <c:v>2695680</c:v>
+                </c:pt>
+                <c:pt idx="219">
+                  <c:v>2764800</c:v>
+                </c:pt>
+                <c:pt idx="220">
+                  <c:v>2833920</c:v>
+                </c:pt>
+                <c:pt idx="221">
+                  <c:v>2903040</c:v>
+                </c:pt>
+                <c:pt idx="222">
+                  <c:v>2972160</c:v>
+                </c:pt>
+                <c:pt idx="223">
+                  <c:v>3041280</c:v>
+                </c:pt>
+                <c:pt idx="224">
+                  <c:v>3110400</c:v>
+                </c:pt>
+                <c:pt idx="225">
+                  <c:v>3179520</c:v>
+                </c:pt>
+                <c:pt idx="226">
+                  <c:v>3248640</c:v>
+                </c:pt>
+                <c:pt idx="227">
+                  <c:v>3317760</c:v>
+                </c:pt>
+                <c:pt idx="228">
+                  <c:v>3386880</c:v>
+                </c:pt>
+                <c:pt idx="229">
+                  <c:v>3456000</c:v>
+                </c:pt>
+                <c:pt idx="230">
+                  <c:v>3525120</c:v>
+                </c:pt>
+                <c:pt idx="231">
+                  <c:v>3594240</c:v>
+                </c:pt>
+                <c:pt idx="232">
+                  <c:v>3663360</c:v>
+                </c:pt>
+                <c:pt idx="233">
+                  <c:v>3732480</c:v>
+                </c:pt>
+                <c:pt idx="234">
+                  <c:v>3801600</c:v>
+                </c:pt>
+                <c:pt idx="235">
+                  <c:v>3870720</c:v>
+                </c:pt>
+                <c:pt idx="236">
+                  <c:v>3939840</c:v>
+                </c:pt>
+                <c:pt idx="237">
+                  <c:v>4008960</c:v>
+                </c:pt>
+                <c:pt idx="238">
+                  <c:v>4078080</c:v>
+                </c:pt>
+                <c:pt idx="239">
+                  <c:v>0</c:v>
+                </c:pt>
+                <c:pt idx="240">
+                  <c:v>69120</c:v>
+                </c:pt>
+                <c:pt idx="241">
+                  <c:v>138240</c:v>
+                </c:pt>
+                <c:pt idx="242">
+                  <c:v>207360</c:v>
+                </c:pt>
+                <c:pt idx="243">
+                  <c:v>276480</c:v>
+                </c:pt>
+                <c:pt idx="244">
+                  <c:v>345600</c:v>
+                </c:pt>
+                <c:pt idx="245">
+                  <c:v>414720</c:v>
+                </c:pt>
+                <c:pt idx="246">
+                  <c:v>483840</c:v>
+                </c:pt>
+                <c:pt idx="247">
+                  <c:v>552960</c:v>
+                </c:pt>
+                <c:pt idx="248">
+                  <c:v>622080</c:v>
+                </c:pt>
+                <c:pt idx="249">
+                  <c:v>691200</c:v>
+                </c:pt>
+                <c:pt idx="250">
+                  <c:v>760320</c:v>
+                </c:pt>
+                <c:pt idx="251">
+                  <c:v>829440</c:v>
+                </c:pt>
+                <c:pt idx="252">
+                  <c:v>898560</c:v>
+                </c:pt>
+                <c:pt idx="253">
+                  <c:v>967680</c:v>
+                </c:pt>
+                <c:pt idx="254">
+                  <c:v>1036800</c:v>
+                </c:pt>
+                <c:pt idx="255">
+                  <c:v>1105920</c:v>
+                </c:pt>
+                <c:pt idx="256">
+                  <c:v>1175040</c:v>
+                </c:pt>
+                <c:pt idx="257">
+                  <c:v>1244160</c:v>
+                </c:pt>
+                <c:pt idx="258">
+                  <c:v>1313280</c:v>
+                </c:pt>
+                <c:pt idx="259">
+                  <c:v>1382400</c:v>
+                </c:pt>
+                <c:pt idx="260">
+                  <c:v>1451520</c:v>
+                </c:pt>
+                <c:pt idx="261">
+                  <c:v>1520640</c:v>
+                </c:pt>
+                <c:pt idx="262">
+                  <c:v>1589760</c:v>
+                </c:pt>
+                <c:pt idx="263">
+                  <c:v>1658880</c:v>
+                </c:pt>
+                <c:pt idx="264">
+                  <c:v>1728000</c:v>
+                </c:pt>
+                <c:pt idx="265">
+                  <c:v>1797120</c:v>
+                </c:pt>
+                <c:pt idx="266">
+                  <c:v>1866240</c:v>
+                </c:pt>
+                <c:pt idx="267">
+                  <c:v>1935360</c:v>
+                </c:pt>
+                <c:pt idx="268">
+                  <c:v>2004480</c:v>
+                </c:pt>
+                <c:pt idx="269">
+                  <c:v>2073600</c:v>
+                </c:pt>
+                <c:pt idx="270">
+                  <c:v>2142720</c:v>
+                </c:pt>
+                <c:pt idx="271">
+                  <c:v>2211840</c:v>
+                </c:pt>
+                <c:pt idx="272">
+                  <c:v>2280960</c:v>
+                </c:pt>
+                <c:pt idx="273">
+                  <c:v>2350080</c:v>
+                </c:pt>
+                <c:pt idx="274">
+                  <c:v>2419200</c:v>
+                </c:pt>
+                <c:pt idx="275">
+                  <c:v>2488320</c:v>
+                </c:pt>
+                <c:pt idx="276">
+                  <c:v>2557440</c:v>
+                </c:pt>
+                <c:pt idx="277">
+                  <c:v>2626560</c:v>
+                </c:pt>
+                <c:pt idx="278">
+                  <c:v>2695680</c:v>
+                </c:pt>
+                <c:pt idx="279">
+                  <c:v>2764800</c:v>
+                </c:pt>
+                <c:pt idx="280">
+                  <c:v>2833920</c:v>
+                </c:pt>
+                <c:pt idx="281">
+                  <c:v>2903040</c:v>
+                </c:pt>
+                <c:pt idx="282">
+                  <c:v>2972160</c:v>
+                </c:pt>
+                <c:pt idx="283">
+                  <c:v>3041280</c:v>
+                </c:pt>
+                <c:pt idx="284">
+                  <c:v>3110400</c:v>
+                </c:pt>
+                <c:pt idx="285">
+                  <c:v>3179520</c:v>
+                </c:pt>
+                <c:pt idx="286">
+                  <c:v>3248640</c:v>
+                </c:pt>
+                <c:pt idx="287">
+                  <c:v>3317760</c:v>
+                </c:pt>
+                <c:pt idx="288">
+                  <c:v>3386880</c:v>
+                </c:pt>
+                <c:pt idx="289">
+                  <c:v>3456000</c:v>
+                </c:pt>
+                <c:pt idx="290">
+                  <c:v>3525120</c:v>
+                </c:pt>
+                <c:pt idx="291">
+                  <c:v>3594240</c:v>
+                </c:pt>
+                <c:pt idx="292">
+                  <c:v>3663360</c:v>
+                </c:pt>
+                <c:pt idx="293">
+                  <c:v>3732480</c:v>
+                </c:pt>
+                <c:pt idx="294">
+                  <c:v>3801600</c:v>
+                </c:pt>
+                <c:pt idx="295">
+                  <c:v>3870720</c:v>
+                </c:pt>
+                <c:pt idx="296">
+                  <c:v>3939840</c:v>
+                </c:pt>
+                <c:pt idx="297">
+                  <c:v>4008960</c:v>
+                </c:pt>
+                <c:pt idx="298">
+                  <c:v>4078080</c:v>
+                </c:pt>
+                <c:pt idx="299">
+                  <c:v>0</c:v>
+                </c:pt>
+              </c:numCache>
+            </c:numRef>
+          </c:xVal>
+          <c:yVal>
+            <c:numRef>
+              <c:f>comparating!$E$2:$E$301</c:f>
+              <c:numCache>
+                <c:formatCode>General</c:formatCode>
+                <c:ptCount val="300"/>
+                <c:pt idx="0">
+                  <c:v>0.41716343336416162</c:v>
+                </c:pt>
+                <c:pt idx="1">
+                  <c:v>9.244764092288813</c:v>
+                </c:pt>
+                <c:pt idx="2">
+                  <c:v>10.562050727841346</c:v>
+                </c:pt>
+                <c:pt idx="3">
+                  <c:v>13.184710135157468</c:v>
+                </c:pt>
+                <c:pt idx="4">
+                  <c:v>10.394757735531259</c:v>
+                </c:pt>
+                <c:pt idx="5">
+                  <c:v>12.022855528429963</c:v>
+                </c:pt>
+                <c:pt idx="6">
+                  <c:v>10.973076786400812</c:v>
+                </c:pt>
+                <c:pt idx="7">
+                  <c:v>11.1604227230006</c:v>
+                </c:pt>
+                <c:pt idx="8">
+                  <c:v>9.4776427743987721</c:v>
+                </c:pt>
+                <c:pt idx="9">
+                  <c:v>9.669695446478185</c:v>
+                </c:pt>
+                <c:pt idx="10">
+                  <c:v>8.8063124260315071</c:v>
+                </c:pt>
+                <c:pt idx="11">
+                  <c:v>16.629097104806789</c:v>
+                </c:pt>
+                <c:pt idx="12">
+                  <c:v>9.1076780689448817</c:v>
+                </c:pt>
+                <c:pt idx="13">
+                  <c:v>9.204723906244574</c:v>
+                </c:pt>
+                <c:pt idx="14">
+                  <c:v>9.7393715242286962</c:v>
+                </c:pt>
+                <c:pt idx="15">
+                  <c:v>9.2450058031055971</c:v>
+                </c:pt>
+                <c:pt idx="16">
+                  <c:v>9.45051028088705</c:v>
+                </c:pt>
+                <c:pt idx="17">
+                  <c:v>8.5106144673723403</c:v>
+                </c:pt>
+                <c:pt idx="18">
+                  <c:v>8.0827606275157411</c:v>
+                </c:pt>
+                <c:pt idx="19">
+                  <c:v>9.2075118723637122</c:v>
+                </c:pt>
+                <c:pt idx="20">
+                  <c:v>10.225248425668266</c:v>
+                </c:pt>
+                <c:pt idx="21">
+                  <c:v>8.1372139578460505</c:v>
+                </c:pt>
+                <c:pt idx="22">
+                  <c:v>8.9290553045259191</c:v>
+                </c:pt>
+                <c:pt idx="23">
+                  <c:v>8.4800757879236937</c:v>
+                </c:pt>
+                <c:pt idx="24">
+                  <c:v>12.534137751731377</c:v>
+                </c:pt>
+                <c:pt idx="25">
+                  <c:v>9.1409091323554499</c:v>
+                </c:pt>
+                <c:pt idx="26">
+                  <c:v>8.9013513918676352</c:v>
+                </c:pt>
+                <c:pt idx="27">
+                  <c:v>8.6936744957341627</c:v>
+                </c:pt>
+                <c:pt idx="28">
+                  <c:v>8.8063834555641538</c:v>
+                </c:pt>
+                <c:pt idx="29">
+                  <c:v>9.0030249165019622</c:v>
+                </c:pt>
+                <c:pt idx="30">
+                  <c:v>9.2993938204930906</c:v>
+                </c:pt>
+                <c:pt idx="31">
+                  <c:v>9.3464017001129882</c:v>
+                </c:pt>
+                <c:pt idx="32">
+                  <c:v>9.0878382862645566</c:v>
+                </c:pt>
+                <c:pt idx="33">
+                  <c:v>8.8489758136621077</c:v>
+                </c:pt>
+                <c:pt idx="34">
+                  <c:v>8.4395453227550092</c:v>
+                </c:pt>
+                <c:pt idx="35">
+                  <c:v>8.6739905334784186</c:v>
+                </c:pt>
+                <c:pt idx="36">
+                  <c:v>11.561292341883586</c:v>
+                </c:pt>
+                <c:pt idx="37">
+                  <c:v>9.9570682337577345</c:v>
+                </c:pt>
+                <c:pt idx="38">
+                  <c:v>9.4655746904415885</c:v>
+                </c:pt>
+                <c:pt idx="39">
+                  <c:v>8.5503806259919521</c:v>
+                </c:pt>
+                <c:pt idx="40">
+                  <c:v>9.0290938751791803</c:v>
+                </c:pt>
+                <c:pt idx="41">
+                  <c:v>8.3909367020873145</c:v>
+                </c:pt>
+                <c:pt idx="42">
+                  <c:v>9.2686185251228679</c:v>
+                </c:pt>
+                <c:pt idx="43">
+                  <c:v>9.9023848800863377</c:v>
+                </c:pt>
+                <c:pt idx="44">
+                  <c:v>9.5538655905204646</c:v>
+                </c:pt>
+                <c:pt idx="45">
+                  <c:v>9.8915598755875855</c:v>
+                </c:pt>
+                <c:pt idx="46">
+                  <c:v>10.597156943132047</c:v>
+                </c:pt>
+                <c:pt idx="47">
+                  <c:v>10.648369177423897</c:v>
+                </c:pt>
+                <c:pt idx="48">
+                  <c:v>11.748658380529568</c:v>
+                </c:pt>
+                <c:pt idx="49">
+                  <c:v>12.029611097524244</c:v>
+                </c:pt>
+                <c:pt idx="50">
+                  <c:v>12.54490164950488</c:v>
+                </c:pt>
+                <c:pt idx="51">
+                  <c:v>18.747475690221272</c:v>
+                </c:pt>
+                <c:pt idx="52">
+                  <c:v>14.816536184046935</c:v>
+                </c:pt>
+                <c:pt idx="53">
+                  <c:v>13.746693430426726</c:v>
+                </c:pt>
+                <c:pt idx="54">
+                  <c:v>13.550243811514097</c:v>
+                </c:pt>
+                <c:pt idx="55">
+                  <c:v>12.951204083047749</c:v>
+                </c:pt>
+                <c:pt idx="56">
+                  <c:v>12.809953526624762</c:v>
+                </c:pt>
+                <c:pt idx="57">
+                  <c:v>12.794912941378753</c:v>
+                </c:pt>
+                <c:pt idx="58">
+                  <c:v>13.890381059216212</c:v>
+                </c:pt>
+                <c:pt idx="59">
+                  <c:v>0</c:v>
+                </c:pt>
+                <c:pt idx="60">
+                  <c:v>10.216616802254418</c:v>
+                </c:pt>
+                <c:pt idx="61">
+                  <c:v>7.5273177728517462</c:v>
+                </c:pt>
+                <c:pt idx="62">
+                  <c:v>5.5674256094337276</c:v>
+                </c:pt>
+                <c:pt idx="63">
+                  <c:v>6.7749958663115635</c:v>
+                </c:pt>
+                <c:pt idx="64">
+                  <c:v>8.3770822025445817</c:v>
+                </c:pt>
+                <c:pt idx="65">
+                  <c:v>6.1281567514024724</c:v>
+                </c:pt>
+                <c:pt idx="66">
+                  <c:v>6.322589351714667</c:v>
+                </c:pt>
+                <c:pt idx="67">
+                  <c:v>6.492392127521744</c:v>
+                </c:pt>
+                <c:pt idx="68">
+                  <c:v>6.5430772440233458</c:v>
+                </c:pt>
+                <c:pt idx="69">
+                  <c:v>6.6816348104883412</c:v>
+                </c:pt>
+                <c:pt idx="70">
+                  <c:v>7.6917722359553879</c:v>
+                </c:pt>
+                <c:pt idx="71">
+                  <c:v>7.5134309081355548</c:v>
+                </c:pt>
+                <c:pt idx="72">
+                  <c:v>8.0419452451567626</c:v>
+                </c:pt>
+                <c:pt idx="73">
+                  <c:v>8.4655980938123268</c:v>
+                </c:pt>
+                <c:pt idx="74">
+                  <c:v>8.2962875432566037</c:v>
+                </c:pt>
+                <c:pt idx="75">
+                  <c:v>8.6317799743740302</c:v>
+                </c:pt>
+                <c:pt idx="76">
+                  <c:v>8.0373941311375905</c:v>
+                </c:pt>
+                <c:pt idx="77">
+                  <c:v>8.2322760228379419</c:v>
+                </c:pt>
+                <c:pt idx="78">
+                  <c:v>8.3488509140317539</c:v>
+                </c:pt>
+                <c:pt idx="79">
+                  <c:v>8.4513266051959928</c:v>
+                </c:pt>
+                <c:pt idx="80">
+                  <c:v>8.01599910114723</c:v>
+                </c:pt>
+                <c:pt idx="81">
+                  <c:v>8.4493402621764719</c:v>
+                </c:pt>
+                <c:pt idx="82">
+                  <c:v>8.3026789901372915</c:v>
+                </c:pt>
+                <c:pt idx="83">
+                  <c:v>8.6789510106741563</c:v>
+                </c:pt>
+                <c:pt idx="84">
+                  <c:v>8.0640413627437368</c:v>
+                </c:pt>
+                <c:pt idx="85">
+                  <c:v>8.0675869610325215</c:v>
+                </c:pt>
+                <c:pt idx="86">
+                  <c:v>8.1130662419475144</c:v>
+                </c:pt>
+                <c:pt idx="87">
+                  <c:v>8.9447681944158202</c:v>
+                </c:pt>
+                <c:pt idx="88">
+                  <c:v>8.1369076586383198</c:v>
+                </c:pt>
+                <c:pt idx="89">
+                  <c:v>8.4531960421023644</c:v>
+                </c:pt>
+                <c:pt idx="90">
+                  <c:v>8.5436816815781054</c:v>
+                </c:pt>
+                <c:pt idx="91">
+                  <c:v>7.895505829071304</c:v>
+                </c:pt>
+                <c:pt idx="92">
+                  <c:v>8.3229983629638404</c:v>
+                </c:pt>
+                <c:pt idx="93">
+                  <c:v>8.6440761590828181</c:v>
+                </c:pt>
+                <c:pt idx="94">
+                  <c:v>8.9910535489502177</c:v>
+                </c:pt>
+                <c:pt idx="95">
+                  <c:v>8.5877988767607167</c:v>
+                </c:pt>
+                <c:pt idx="96">
+                  <c:v>8.2103925111527278</c:v>
+                </c:pt>
+                <c:pt idx="97">
+                  <c:v>9.0525222466671984</c:v>
+                </c:pt>
+                <c:pt idx="98">
+                  <c:v>8.9920493822728425</c:v>
+                </c:pt>
+                <c:pt idx="99">
+                  <c:v>8.6798151367810377</c:v>
+                </c:pt>
+                <c:pt idx="100">
+                  <c:v>8.4095213834217013</c:v>
+                </c:pt>
+                <c:pt idx="101">
+                  <c:v>8.9613461967077317</c:v>
+                </c:pt>
+                <c:pt idx="102">
+                  <c:v>11.874227391092049</c:v>
+                </c:pt>
+                <c:pt idx="103">
+                  <c:v>10.080420489413561</c:v>
+                </c:pt>
+                <c:pt idx="104">
+                  <c:v>15.681461303984666</c:v>
+                </c:pt>
+                <c:pt idx="105">
+                  <c:v>9.694147433025238</c:v>
+                </c:pt>
+                <c:pt idx="106">
+                  <c:v>14.132303629508144</c:v>
+                </c:pt>
+                <c:pt idx="107">
+                  <c:v>9.2091041846533148</c:v>
+                </c:pt>
+                <c:pt idx="108">
+                  <c:v>9.0135878202090911</c:v>
+                </c:pt>
+                <c:pt idx="109">
+                  <c:v>10.940920308175553</c:v>
+                </c:pt>
+                <c:pt idx="110">
+                  <c:v>11.283310342649626</c:v>
+                </c:pt>
+                <c:pt idx="111">
+                  <c:v>13.650567160014683</c:v>
+                </c:pt>
+                <c:pt idx="112">
+                  <c:v>12.131016865151745</c:v>
+                </c:pt>
+                <c:pt idx="113">
+                  <c:v>10.783052064729679</c:v>
+                </c:pt>
+                <c:pt idx="114">
+                  <c:v>11.070542865021244</c:v>
+                </c:pt>
+                <c:pt idx="115">
+                  <c:v>15.666475582743995</c:v>
+                </c:pt>
+                <c:pt idx="116">
+                  <c:v>11.19577886060614</c:v>
+                </c:pt>
+                <c:pt idx="117">
+                  <c:v>11.673129111108173</c:v>
+                </c:pt>
+                <c:pt idx="118">
+                  <c:v>12.245884843770247</c:v>
+                </c:pt>
+                <c:pt idx="119">
+                  <c:v>0</c:v>
+                </c:pt>
+                <c:pt idx="120">
+                  <c:v>14.647696285016112</c:v>
+                </c:pt>
+                <c:pt idx="121">
+                  <c:v>8.8384381692315035</c:v>
+                </c:pt>
+                <c:pt idx="122">
+                  <c:v>10.143977585127969</c:v>
+                </c:pt>
+                <c:pt idx="123">
+                  <c:v>10.258552074632188</c:v>
+                </c:pt>
+                <c:pt idx="124">
+                  <c:v>10.302083878796713</c:v>
+                </c:pt>
+                <c:pt idx="125">
+                  <c:v>8.2687900105348664</c:v>
+                </c:pt>
+                <c:pt idx="126">
+                  <c:v>8.2538051095428884</c:v>
+                </c:pt>
+                <c:pt idx="127">
+                  <c:v>7.9043032656871786</c:v>
+                </c:pt>
+                <c:pt idx="128">
+                  <c:v>7.6814722348085782</c:v>
+                </c:pt>
+                <c:pt idx="129">
+                  <c:v>8.3943590304859939</c:v>
+                </c:pt>
+                <c:pt idx="130">
+                  <c:v>7.4450254437313275</c:v>
+                </c:pt>
+                <c:pt idx="131">
+                  <c:v>8.0051381384281513</c:v>
+                </c:pt>
+                <c:pt idx="132">
+                  <c:v>8.2497517916200032</c:v>
+                </c:pt>
+                <c:pt idx="133">
+                  <c:v>8.2059899675812336</c:v>
+                </c:pt>
+                <c:pt idx="134">
+                  <c:v>7.7858152408033403</c:v>
+                </c:pt>
+                <c:pt idx="135">
+                  <c:v>7.6781654356361235</c:v>
+                </c:pt>
+                <c:pt idx="136">
+                  <c:v>8.0254164653285844</c:v>
+                </c:pt>
+                <c:pt idx="137">
+                  <c:v>8.1450072686157196</c:v>
+                </c:pt>
+                <c:pt idx="138">
+                  <c:v>8.3239930160792621</c:v>
+                </c:pt>
+                <c:pt idx="139">
+                  <c:v>8.7391752632420108</c:v>
+                </c:pt>
+                <c:pt idx="140">
+                  <c:v>8.0302323897971313</c:v>
+                </c:pt>
+                <c:pt idx="141">
+                  <c:v>7.9438784744283399</c:v>
+                </c:pt>
+                <c:pt idx="142">
+                  <c:v>8.2132519043144043</c:v>
+                </c:pt>
+                <c:pt idx="143">
+                  <c:v>7.8090058804907789</c:v>
+                </c:pt>
+                <c:pt idx="144">
+                  <c:v>8.0614818610981445</c:v>
+                </c:pt>
+                <c:pt idx="145">
+                  <c:v>8.2274177690248393</c:v>
+                </c:pt>
+                <c:pt idx="146">
+                  <c:v>8.2840228891565637</c:v>
+                </c:pt>
+                <c:pt idx="147">
+                  <c:v>9.3903348421791684</c:v>
+                </c:pt>
+                <c:pt idx="148">
+                  <c:v>8.6060271506797488</c:v>
+                </c:pt>
+                <c:pt idx="149">
+                  <c:v>9.387990684533035</c:v>
+                </c:pt>
+                <c:pt idx="150">
+                  <c:v>9.5304443290761363</c:v>
+                </c:pt>
+                <c:pt idx="151">
+                  <c:v>9.081087845347577</c:v>
+                </c:pt>
+                <c:pt idx="152">
+                  <c:v>8.2906362503205795</c:v>
+                </c:pt>
+                <c:pt idx="153">
+                  <c:v>8.2135694628860119</c:v>
+                </c:pt>
+                <c:pt idx="154">
+                  <c:v>7.7113714282903345</c:v>
+                </c:pt>
+                <c:pt idx="155">
+                  <c:v>8.3448538149945115</c:v>
+                </c:pt>
+                <c:pt idx="156">
+                  <c:v>8.4454404718894942</c:v>
+                </c:pt>
+                <c:pt idx="157">
+                  <c:v>8.4813020672553527</c:v>
+                </c:pt>
+                <c:pt idx="158">
+                  <c:v>8.2918131033562226</c:v>
+                </c:pt>
+                <c:pt idx="159">
+                  <c:v>7.434536629082487</c:v>
+                </c:pt>
+                <c:pt idx="160">
+                  <c:v>7.8986801219811982</c:v>
+                </c:pt>
+                <c:pt idx="161">
+                  <c:v>8.6706944614397763</c:v>
+                </c:pt>
+                <c:pt idx="162">
+                  <c:v>9.3728208546756928</c:v>
+                </c:pt>
+                <c:pt idx="163">
+                  <c:v>9.0314422337007603</c:v>
+                </c:pt>
+                <c:pt idx="164">
+                  <c:v>9.186892411000116</c:v>
+                </c:pt>
+                <c:pt idx="165">
+                  <c:v>10.052362898722407</c:v>
+                </c:pt>
+                <c:pt idx="166">
+                  <c:v>10.218441197440104</c:v>
+                </c:pt>
+                <c:pt idx="167">
+                  <c:v>9.4575590643510594</c:v>
+                </c:pt>
+                <c:pt idx="168">
+                  <c:v>11.493409209894107</c:v>
+                </c:pt>
+                <c:pt idx="169">
+                  <c:v>11.805319174602868</c:v>
+                </c:pt>
+                <c:pt idx="170">
+                  <c:v>9.5649530469789106</c:v>
+                </c:pt>
+                <c:pt idx="171">
+                  <c:v>10.629256407406105</c:v>
+                </c:pt>
+                <c:pt idx="172">
+                  <c:v>11.45080742424142</c:v>
+                </c:pt>
+                <c:pt idx="173">
+                  <c:v>10.681776460118636</c:v>
+                </c:pt>
+                <c:pt idx="174">
+                  <c:v>10.732290399124674</c:v>
+                </c:pt>
+                <c:pt idx="175">
+                  <c:v>10.355179835155052</c:v>
+                </c:pt>
+                <c:pt idx="176">
+                  <c:v>12.141266076011568</c:v>
+                </c:pt>
+                <c:pt idx="177">
+                  <c:v>18.501234281248006</c:v>
+                </c:pt>
+                <c:pt idx="178">
+                  <c:v>14.677301216546928</c:v>
+                </c:pt>
+                <c:pt idx="179">
+                  <c:v>0</c:v>
+                </c:pt>
+                <c:pt idx="180">
+                  <c:v>12.258597382043563</c:v>
+                </c:pt>
+                <c:pt idx="181">
+                  <c:v>8.4975789705585925</c:v>
+                </c:pt>
+                <c:pt idx="182">
+                  <c:v>8.0067722591008454</c:v>
+                </c:pt>
+                <c:pt idx="183">
+                  <c:v>7.8775328752157119</c:v>
+                </c:pt>
+                <c:pt idx="184">
+                  <c:v>8.830293983668847</c:v>
+                </c:pt>
+                <c:pt idx="185">
+                  <c:v>8.2379268043345064</c:v>
+                </c:pt>
+                <c:pt idx="186">
+                  <c:v>8.5800249744068946</c:v>
+                </c:pt>
+                <c:pt idx="187">
+                  <c:v>7.7007117813163672</c:v>
+                </c:pt>
+                <c:pt idx="188">
+                  <c:v>7.7085392573264038</c:v>
+                </c:pt>
+                <c:pt idx="189">
+                  <c:v>7.1419896977866619</c:v>
+                </c:pt>
+                <c:pt idx="190">
+                  <c:v>8.4506520116067563</c:v>
+                </c:pt>
+                <c:pt idx="191">
+                  <c:v>8.0636592364552389</c:v>
+                </c:pt>
+                <c:pt idx="192">
+                  <c:v>7.9429729729729779</c:v>
+                </c:pt>
+                <c:pt idx="193">
+                  <c:v>7.9802100431119429</c:v>
+                </c:pt>
+                <c:pt idx="194">
+                  <c:v>8.0167945354808019</c:v>
+                </c:pt>
+                <c:pt idx="195">
+                  <c:v>7.4137250161186392</c:v>
+                </c:pt>
+                <c:pt idx="196">
+                  <c:v>8.1734465753487662</c:v>
+                </c:pt>
+                <c:pt idx="197">
+                  <c:v>7.7906701042852777</c:v>
+                </c:pt>
+                <c:pt idx="198">
+                  <c:v>7.5841180478443473</c:v>
+                </c:pt>
+                <c:pt idx="199">
+                  <c:v>7.3285852700050196</c:v>
+                </c:pt>
+                <c:pt idx="200">
+                  <c:v>7.9566038595795074</c:v>
+                </c:pt>
+                <c:pt idx="201">
+                  <c:v>7.9998756905476878</c:v>
+                </c:pt>
+                <c:pt idx="202">
+                  <c:v>8.0821469088719233</c:v>
+                </c:pt>
+                <c:pt idx="203">
+                  <c:v>7.6369631513753324</c:v>
+                </c:pt>
+                <c:pt idx="204">
+                  <c:v>8.4868689168421358</c:v>
+                </c:pt>
+                <c:pt idx="205">
+                  <c:v>7.6655508391990566</c:v>
+                </c:pt>
+                <c:pt idx="206">
+                  <c:v>8.1226779775490545</c:v>
+                </c:pt>
+                <c:pt idx="207">
+                  <c:v>8.2791493049281755</c:v>
+                </c:pt>
+                <c:pt idx="208">
+                  <c:v>8.2706225222430856</c:v>
+                </c:pt>
+                <c:pt idx="209">
+                  <c:v>8.1384911624131142</c:v>
+                </c:pt>
+                <c:pt idx="210">
+                  <c:v>8.1923325624574126</c:v>
+                </c:pt>
+                <c:pt idx="211">
+                  <c:v>8.2616407144620521</c:v>
+                </c:pt>
+                <c:pt idx="212">
+                  <c:v>8.487355939508916</c:v>
+                </c:pt>
+                <c:pt idx="213">
+                  <c:v>8.4906515797771522</c:v>
+                </c:pt>
+                <c:pt idx="214">
+                  <c:v>7.8561569283789003</c:v>
+                </c:pt>
+                <c:pt idx="215">
+                  <c:v>8.4218127908002867</c:v>
+                </c:pt>
+                <c:pt idx="216">
+                  <c:v>7.9935027326882224</c:v>
+                </c:pt>
+                <c:pt idx="217">
+                  <c:v>8.3114450808201532</c:v>
+                </c:pt>
+                <c:pt idx="218">
+                  <c:v>8.0732926953081705</c:v>
+                </c:pt>
+                <c:pt idx="219">
+                  <c:v>8.3277092869479485</c:v>
+                </c:pt>
+                <c:pt idx="220">
+                  <c:v>7.9831586293783792</c:v>
+                </c:pt>
+                <c:pt idx="221">
+                  <c:v>8.440015083463031</c:v>
+                </c:pt>
+                <c:pt idx="222">
+                  <c:v>8.3400519515186851</c:v>
+                </c:pt>
+                <c:pt idx="223">
+                  <c:v>8.6421033758684249</c:v>
+                </c:pt>
+                <c:pt idx="224">
+                  <c:v>8.3565394294085191</c:v>
+                </c:pt>
+                <c:pt idx="225">
+                  <c:v>8.8677540780474402</c:v>
+                </c:pt>
+                <c:pt idx="226">
+                  <c:v>10.230133072917511</c:v>
+                </c:pt>
+                <c:pt idx="227">
+                  <c:v>10.031038293319098</c:v>
+                </c:pt>
+                <c:pt idx="228">
+                  <c:v>10.886972666115462</c:v>
+                </c:pt>
+                <c:pt idx="229">
+                  <c:v>11.04754586133344</c:v>
+                </c:pt>
+                <c:pt idx="230">
+                  <c:v>11.529875564091542</c:v>
+                </c:pt>
+                <c:pt idx="231">
+                  <c:v>15.414820854905757</c:v>
+                </c:pt>
+                <c:pt idx="232">
+                  <c:v>14.42623486842084</c:v>
+                </c:pt>
+                <c:pt idx="233">
+                  <c:v>12.916282285211638</c:v>
+                </c:pt>
+                <c:pt idx="234">
+                  <c:v>14.023198760349141</c:v>
+                </c:pt>
+                <c:pt idx="235">
+                  <c:v>12.768971795878244</c:v>
+                </c:pt>
+                <c:pt idx="236">
+                  <c:v>14.272357457437838</c:v>
+                </c:pt>
+                <c:pt idx="237">
+                  <c:v>14.557185305534345</c:v>
+                </c:pt>
+                <c:pt idx="238">
+                  <c:v>14.15588468202427</c:v>
+                </c:pt>
+                <c:pt idx="239">
+                  <c:v>0</c:v>
+                </c:pt>
+                <c:pt idx="240">
+                  <c:v>9.6819445136225646</c:v>
+                </c:pt>
+                <c:pt idx="241">
+                  <c:v>9.1643001927376968</c:v>
+                </c:pt>
+                <c:pt idx="242">
+                  <c:v>10.116080970862853</c:v>
+                </c:pt>
+                <c:pt idx="243">
+                  <c:v>10.121106834042804</c:v>
+                </c:pt>
+                <c:pt idx="244">
+                  <c:v>10.579932206753659</c:v>
+                </c:pt>
+                <c:pt idx="245">
+                  <c:v>9.7204175296769577</c:v>
+                </c:pt>
+                <c:pt idx="246">
+                  <c:v>9.0881872410491003</c:v>
+                </c:pt>
+                <c:pt idx="247">
+                  <c:v>9.2010760226378761</c:v>
+                </c:pt>
+                <c:pt idx="248">
+                  <c:v>9.0218978531978617</c:v>
+                </c:pt>
+                <c:pt idx="249">
+                  <c:v>10.025687202388733</c:v>
+                </c:pt>
+                <c:pt idx="250">
+                  <c:v>11.251290805703851</c:v>
+                </c:pt>
+                <c:pt idx="251">
+                  <c:v>10.65494731945876</c:v>
+                </c:pt>
+                <c:pt idx="252">
+                  <c:v>10.459846745080579</c:v>
+                </c:pt>
+                <c:pt idx="253">
+                  <c:v>10.446050981824245</c:v>
+                </c:pt>
+                <c:pt idx="254">
+                  <c:v>9.402828568108621</c:v>
+                </c:pt>
+                <c:pt idx="255">
+                  <c:v>7.7803632384282109</c:v>
+                </c:pt>
+                <c:pt idx="256">
+                  <c:v>9.5392339356822955</c:v>
+                </c:pt>
+                <c:pt idx="257">
+                  <c:v>9.4608521303872788</c:v>
+                </c:pt>
+                <c:pt idx="258">
+                  <c:v>9.3505094274025282</c:v>
+                </c:pt>
+                <c:pt idx="259">
+                  <c:v>9.4154839673619595</c:v>
+                </c:pt>
+                <c:pt idx="260">
+                  <c:v>9.4499993093900461</c:v>
+                </c:pt>
+                <c:pt idx="261">
+                  <c:v>9.6351439493858724</c:v>
+                </c:pt>
+                <c:pt idx="262">
+                  <c:v>9.7436577595734715</c:v>
+                </c:pt>
+                <c:pt idx="263">
+                  <c:v>9.6717143616950896</c:v>
+                </c:pt>
+                <c:pt idx="264">
+                  <c:v>9.4043269326544934</c:v>
+                </c:pt>
+                <c:pt idx="265">
+                  <c:v>9.6198464960288437</c:v>
+                </c:pt>
+                <c:pt idx="266">
+                  <c:v>9.7605415336745178</c:v>
+                </c:pt>
+                <c:pt idx="267">
+                  <c:v>9.4483174770354772</c:v>
+                </c:pt>
+                <c:pt idx="268">
+                  <c:v>9.9222377792364149</c:v>
+                </c:pt>
+                <c:pt idx="269">
+                  <c:v>9.3998017434344998</c:v>
+                </c:pt>
+                <c:pt idx="270">
+                  <c:v>9.8955932195804213</c:v>
+                </c:pt>
+                <c:pt idx="271">
+                  <c:v>9.577777374501883</c:v>
+                </c:pt>
+                <c:pt idx="272">
+                  <c:v>9.6571846257768037</c:v>
+                </c:pt>
+                <c:pt idx="273">
+                  <c:v>9.4362731825734105</c:v>
+                </c:pt>
+                <c:pt idx="274">
+                  <c:v>9.7278407608647779</c:v>
+                </c:pt>
+                <c:pt idx="275">
+                  <c:v>10.315292325515143</c:v>
+                </c:pt>
+                <c:pt idx="276">
+                  <c:v>10.364724955157786</c:v>
+                </c:pt>
+                <c:pt idx="277">
+                  <c:v>10.342869696836628</c:v>
+                </c:pt>
+                <c:pt idx="278">
+                  <c:v>9.8793301630371264</c:v>
+                </c:pt>
+                <c:pt idx="279">
+                  <c:v>9.6611457204201567</c:v>
+                </c:pt>
+                <c:pt idx="280">
+                  <c:v>10.22463482402291</c:v>
+                </c:pt>
+                <c:pt idx="281">
+                  <c:v>9.9984239271629285</c:v>
+                </c:pt>
+                <c:pt idx="282">
+                  <c:v>10.316182069409598</c:v>
+                </c:pt>
+                <c:pt idx="283">
+                  <c:v>9.9177148995403499</c:v>
+                </c:pt>
+                <c:pt idx="284">
+                  <c:v>10.680849237555613</c:v>
+                </c:pt>
+                <c:pt idx="285">
+                  <c:v>10.252425965149104</c:v>
+                </c:pt>
+                <c:pt idx="286">
+                  <c:v>10.751712235046888</c:v>
+                </c:pt>
+                <c:pt idx="287">
+                  <c:v>11.84419220762204</c:v>
+                </c:pt>
+                <c:pt idx="288">
+                  <c:v>10.818771761221003</c:v>
+                </c:pt>
+                <c:pt idx="289">
+                  <c:v>16.467582765535838</c:v>
+                </c:pt>
+                <c:pt idx="290">
+                  <c:v>13.486217882439657</c:v>
+                </c:pt>
+                <c:pt idx="291">
+                  <c:v>13.00207860447933</c:v>
+                </c:pt>
+                <c:pt idx="292">
+                  <c:v>16.879928470454548</c:v>
+                </c:pt>
+                <c:pt idx="293">
+                  <c:v>15.339126203158141</c:v>
+                </c:pt>
+                <c:pt idx="294">
+                  <c:v>12.857069883559863</c:v>
+                </c:pt>
+                <c:pt idx="295">
+                  <c:v>16.23596465574186</c:v>
+                </c:pt>
+                <c:pt idx="296">
+                  <c:v>13.804696187378712</c:v>
+                </c:pt>
+                <c:pt idx="297">
+                  <c:v>13.695629006462154</c:v>
+                </c:pt>
+                <c:pt idx="298">
+                  <c:v>19.202446308138036</c:v>
+                </c:pt>
+                <c:pt idx="299">
+                  <c:v>0</c:v>
+                </c:pt>
+              </c:numCache>
+            </c:numRef>
+          </c:yVal>
+          <c:smooth val="0"/>
+          <c:extLst>
+            <c:ext xmlns:c16="http://schemas.microsoft.com/office/drawing/2014/chart" uri="{C3380CC4-5D6E-409C-BE32-E72D297353CC}">
+              <c16:uniqueId val="{00000000-D2BC-49E9-950B-FAA997BDD5B1}"/>
+            </c:ext>
+          </c:extLst>
+        </c:ser>
+        <c:dLbls>
+          <c:showLegendKey val="0"/>
+          <c:showVal val="0"/>
+          <c:showCatName val="0"/>
+          <c:showSerName val="0"/>
+          <c:showPercent val="0"/>
+          <c:showBubbleSize val="0"/>
+        </c:dLbls>
+        <c:axId val="552386816"/>
+        <c:axId val="562548128"/>
+      </c:scatterChart>
+      <c:valAx>
+        <c:axId val="552386816"/>
+        <c:scaling>
+          <c:orientation val="minMax"/>
+        </c:scaling>
+        <c:delete val="0"/>
+        <c:axPos val="b"/>
+        <c:majorGridlines>
+          <c:spPr>
+            <a:ln w="9525" cap="flat" cmpd="sng" algn="ctr">
+              <a:solidFill>
+                <a:schemeClr val="lt1">
+                  <a:lumMod val="95000"/>
+                  <a:alpha val="10000"/>
+                </a:schemeClr>
+              </a:solidFill>
+              <a:round/>
+            </a:ln>
+            <a:effectLst/>
+          </c:spPr>
+        </c:majorGridlines>
+        <c:numFmt formatCode="General" sourceLinked="1"/>
+        <c:majorTickMark val="none"/>
+        <c:minorTickMark val="none"/>
+        <c:tickLblPos val="nextTo"/>
+        <c:spPr>
+          <a:noFill/>
+          <a:ln w="9525" cap="flat" cmpd="sng" algn="ctr">
+            <a:solidFill>
+              <a:schemeClr val="lt1">
+                <a:lumMod val="50000"/>
+              </a:schemeClr>
+            </a:solidFill>
+          </a:ln>
+          <a:effectLst/>
+        </c:spPr>
+        <c:txPr>
+          <a:bodyPr rot="-60000000" spcFirstLastPara="1" vertOverflow="ellipsis" vert="horz" wrap="square" anchor="ctr" anchorCtr="1"/>
+          <a:lstStyle/>
+          <a:p>
+            <a:pPr>
+              <a:defRPr sz="900" b="0" i="0" u="none" strike="noStrike" kern="1200" baseline="0">
+                <a:solidFill>
+                  <a:schemeClr val="lt1">
+                    <a:lumMod val="75000"/>
+                  </a:schemeClr>
+                </a:solidFill>
+                <a:latin typeface="+mn-lt"/>
+                <a:ea typeface="+mn-ea"/>
+                <a:cs typeface="+mn-cs"/>
+              </a:defRPr>
+            </a:pPr>
+            <a:endParaRPr lang="hu-HU"/>
+          </a:p>
+        </c:txPr>
+        <c:crossAx val="562548128"/>
+        <c:crosses val="autoZero"/>
+        <c:crossBetween val="midCat"/>
+      </c:valAx>
+      <c:valAx>
+        <c:axId val="562548128"/>
+        <c:scaling>
+          <c:orientation val="minMax"/>
+        </c:scaling>
+        <c:delete val="0"/>
+        <c:axPos val="l"/>
+        <c:majorGridlines>
+          <c:spPr>
+            <a:ln w="9525" cap="flat" cmpd="sng" algn="ctr">
+              <a:solidFill>
+                <a:schemeClr val="lt1">
+                  <a:lumMod val="95000"/>
+                  <a:alpha val="10000"/>
+                </a:schemeClr>
+              </a:solidFill>
+              <a:round/>
+            </a:ln>
+            <a:effectLst/>
+          </c:spPr>
+        </c:majorGridlines>
+        <c:numFmt formatCode="General" sourceLinked="1"/>
+        <c:majorTickMark val="none"/>
+        <c:minorTickMark val="none"/>
+        <c:tickLblPos val="nextTo"/>
+        <c:spPr>
+          <a:noFill/>
+          <a:ln w="9525" cap="flat" cmpd="sng" algn="ctr">
+            <a:solidFill>
+              <a:schemeClr val="lt1">
+                <a:lumMod val="50000"/>
+              </a:schemeClr>
+            </a:solidFill>
+          </a:ln>
+          <a:effectLst/>
+        </c:spPr>
+        <c:txPr>
+          <a:bodyPr rot="-60000000" spcFirstLastPara="1" vertOverflow="ellipsis" vert="horz" wrap="square" anchor="ctr" anchorCtr="1"/>
+          <a:lstStyle/>
+          <a:p>
+            <a:pPr>
+              <a:defRPr sz="900" b="0" i="0" u="none" strike="noStrike" kern="1200" baseline="0">
+                <a:solidFill>
+                  <a:schemeClr val="lt1">
+                    <a:lumMod val="75000"/>
+                  </a:schemeClr>
+                </a:solidFill>
+                <a:latin typeface="+mn-lt"/>
+                <a:ea typeface="+mn-ea"/>
+                <a:cs typeface="+mn-cs"/>
+              </a:defRPr>
+            </a:pPr>
+            <a:endParaRPr lang="hu-HU"/>
+          </a:p>
+        </c:txPr>
+        <c:crossAx val="552386816"/>
+        <c:crosses val="autoZero"/>
+        <c:crossBetween val="midCat"/>
+      </c:valAx>
+      <c:spPr>
+        <a:noFill/>
+        <a:ln>
+          <a:noFill/>
+        </a:ln>
+        <a:effectLst/>
+      </c:spPr>
+    </c:plotArea>
+    <c:plotVisOnly val="1"/>
+    <c:dispBlanksAs val="gap"/>
+    <c:showDLblsOverMax val="0"/>
+  </c:chart>
+  <c:spPr>
+    <a:gradFill flip="none" rotWithShape="1">
+      <a:gsLst>
+        <a:gs pos="0">
+          <a:schemeClr val="dk1">
+            <a:lumMod val="65000"/>
+            <a:lumOff val="35000"/>
+          </a:schemeClr>
+        </a:gs>
+        <a:gs pos="100000">
+          <a:schemeClr val="dk1">
+            <a:lumMod val="85000"/>
+            <a:lumOff val="15000"/>
+          </a:schemeClr>
+        </a:gs>
+      </a:gsLst>
+      <a:path path="circle">
+        <a:fillToRect l="50000" t="50000" r="50000" b="50000"/>
+      </a:path>
+      <a:tileRect/>
+    </a:gradFill>
+    <a:ln>
+      <a:noFill/>
+    </a:ln>
+    <a:effectLst/>
+  </c:spPr>
+  <c:txPr>
+    <a:bodyPr/>
+    <a:lstStyle/>
+    <a:p>
+      <a:pPr>
+        <a:defRPr/>
+      </a:pPr>
+      <a:endParaRPr lang="hu-HU"/>
+    </a:p>
+  </c:txPr>
+  <c:externalData r:id="rId3">
+    <c:autoUpdate val="0"/>
+  </c:externalData>
+</c:chartSpace>
+</file>
+
 <file path=ppt/charts/colors1.xml><?xml version="1.0" encoding="utf-8"?>
 <cs:colorStyle xmlns:cs="http://schemas.microsoft.com/office/drawing/2012/chartStyle" xmlns:a="http://schemas.openxmlformats.org/drawingml/2006/main" meth="cycle" id="10">
   <a:schemeClr val="accent1"/>
@@ -8072,7 +10210,549 @@
 </cs:colorStyle>
 </file>
 
+<file path=ppt/charts/colors2.xml><?xml version="1.0" encoding="utf-8"?>
+<cs:colorStyle xmlns:cs="http://schemas.microsoft.com/office/drawing/2012/chartStyle" xmlns:a="http://schemas.openxmlformats.org/drawingml/2006/main" meth="cycle" id="10">
+  <a:schemeClr val="accent1"/>
+  <a:schemeClr val="accent2"/>
+  <a:schemeClr val="accent3"/>
+  <a:schemeClr val="accent4"/>
+  <a:schemeClr val="accent5"/>
+  <a:schemeClr val="accent6"/>
+  <cs:variation/>
+  <cs:variation>
+    <a:lumMod val="60000"/>
+  </cs:variation>
+  <cs:variation>
+    <a:lumMod val="80000"/>
+    <a:lumOff val="20000"/>
+  </cs:variation>
+  <cs:variation>
+    <a:lumMod val="80000"/>
+  </cs:variation>
+  <cs:variation>
+    <a:lumMod val="60000"/>
+    <a:lumOff val="40000"/>
+  </cs:variation>
+  <cs:variation>
+    <a:lumMod val="50000"/>
+  </cs:variation>
+  <cs:variation>
+    <a:lumMod val="70000"/>
+    <a:lumOff val="30000"/>
+  </cs:variation>
+  <cs:variation>
+    <a:lumMod val="70000"/>
+  </cs:variation>
+  <cs:variation>
+    <a:lumMod val="50000"/>
+    <a:lumOff val="50000"/>
+  </cs:variation>
+</cs:colorStyle>
+</file>
+
 <file path=ppt/charts/style1.xml><?xml version="1.0" encoding="utf-8"?>
+<cs:chartStyle xmlns:cs="http://schemas.microsoft.com/office/drawing/2012/chartStyle" xmlns:a="http://schemas.openxmlformats.org/drawingml/2006/main" id="248">
+  <cs:axisTitle>
+    <cs:lnRef idx="0"/>
+    <cs:fillRef idx="0"/>
+    <cs:effectRef idx="0"/>
+    <cs:fontRef idx="minor">
+      <a:schemeClr val="lt1">
+        <a:lumMod val="75000"/>
+      </a:schemeClr>
+    </cs:fontRef>
+    <cs:defRPr sz="900" b="1" kern="1200" cap="all"/>
+  </cs:axisTitle>
+  <cs:categoryAxis>
+    <cs:lnRef idx="0"/>
+    <cs:fillRef idx="0"/>
+    <cs:effectRef idx="0"/>
+    <cs:fontRef idx="minor">
+      <a:schemeClr val="lt1">
+        <a:lumMod val="75000"/>
+      </a:schemeClr>
+    </cs:fontRef>
+    <cs:spPr>
+      <a:ln w="9525" cap="flat" cmpd="sng" algn="ctr">
+        <a:solidFill>
+          <a:schemeClr val="lt1">
+            <a:lumMod val="50000"/>
+          </a:schemeClr>
+        </a:solidFill>
+      </a:ln>
+    </cs:spPr>
+    <cs:defRPr sz="900" kern="1200"/>
+  </cs:categoryAxis>
+  <cs:chartArea>
+    <cs:lnRef idx="0"/>
+    <cs:fillRef idx="0"/>
+    <cs:effectRef idx="0"/>
+    <cs:fontRef idx="minor">
+      <a:schemeClr val="dk1"/>
+    </cs:fontRef>
+    <cs:spPr>
+      <a:gradFill flip="none" rotWithShape="1">
+        <a:gsLst>
+          <a:gs pos="0">
+            <a:schemeClr val="dk1">
+              <a:lumMod val="65000"/>
+              <a:lumOff val="35000"/>
+            </a:schemeClr>
+          </a:gs>
+          <a:gs pos="100000">
+            <a:schemeClr val="dk1">
+              <a:lumMod val="85000"/>
+              <a:lumOff val="15000"/>
+            </a:schemeClr>
+          </a:gs>
+        </a:gsLst>
+        <a:path path="circle">
+          <a:fillToRect l="50000" t="50000" r="50000" b="50000"/>
+        </a:path>
+        <a:tileRect/>
+      </a:gradFill>
+    </cs:spPr>
+    <cs:defRPr sz="1000" kern="1200"/>
+  </cs:chartArea>
+  <cs:dataLabel>
+    <cs:lnRef idx="0"/>
+    <cs:fillRef idx="0"/>
+    <cs:effectRef idx="0"/>
+    <cs:fontRef idx="minor">
+      <a:schemeClr val="lt1">
+        <a:lumMod val="75000"/>
+      </a:schemeClr>
+    </cs:fontRef>
+    <cs:defRPr sz="900" kern="1200"/>
+  </cs:dataLabel>
+  <cs:dataLabelCallout>
+    <cs:lnRef idx="0"/>
+    <cs:fillRef idx="0"/>
+    <cs:effectRef idx="0"/>
+    <cs:fontRef idx="minor">
+      <a:schemeClr val="dk1">
+        <a:lumMod val="65000"/>
+        <a:lumOff val="35000"/>
+      </a:schemeClr>
+    </cs:fontRef>
+    <cs:spPr>
+      <a:solidFill>
+        <a:schemeClr val="lt1"/>
+      </a:solidFill>
+    </cs:spPr>
+    <cs:defRPr sz="900" kern="1200"/>
+    <cs:bodyPr rot="0" spcFirstLastPara="1" vertOverflow="clip" horzOverflow="clip" vert="horz" wrap="square" lIns="36576" tIns="18288" rIns="36576" bIns="18288" anchor="ctr" anchorCtr="1">
+      <a:spAutoFit/>
+    </cs:bodyPr>
+  </cs:dataLabelCallout>
+  <cs:dataPoint>
+    <cs:lnRef idx="0"/>
+    <cs:fillRef idx="3">
+      <cs:styleClr val="auto"/>
+    </cs:fillRef>
+    <cs:effectRef idx="3"/>
+    <cs:fontRef idx="minor">
+      <a:schemeClr val="tx1"/>
+    </cs:fontRef>
+  </cs:dataPoint>
+  <cs:dataPoint3D>
+    <cs:lnRef idx="0"/>
+    <cs:fillRef idx="3">
+      <cs:styleClr val="auto"/>
+    </cs:fillRef>
+    <cs:effectRef idx="3"/>
+    <cs:fontRef idx="minor">
+      <a:schemeClr val="tx1"/>
+    </cs:fontRef>
+  </cs:dataPoint3D>
+  <cs:dataPointLine>
+    <cs:lnRef idx="0">
+      <cs:styleClr val="auto"/>
+    </cs:lnRef>
+    <cs:fillRef idx="3"/>
+    <cs:effectRef idx="3"/>
+    <cs:fontRef idx="minor">
+      <a:schemeClr val="tx1"/>
+    </cs:fontRef>
+    <cs:spPr>
+      <a:ln w="9525" cap="rnd">
+        <a:solidFill>
+          <a:schemeClr val="phClr"/>
+        </a:solidFill>
+        <a:round/>
+      </a:ln>
+    </cs:spPr>
+  </cs:dataPointLine>
+  <cs:dataPointMarker>
+    <cs:lnRef idx="0">
+      <cs:styleClr val="auto"/>
+    </cs:lnRef>
+    <cs:fillRef idx="3">
+      <cs:styleClr val="auto"/>
+    </cs:fillRef>
+    <cs:effectRef idx="3"/>
+    <cs:fontRef idx="minor">
+      <a:schemeClr val="tx1"/>
+    </cs:fontRef>
+    <cs:spPr>
+      <a:ln w="9525" cap="rnd">
+        <a:solidFill>
+          <a:schemeClr val="phClr"/>
+        </a:solidFill>
+        <a:round/>
+      </a:ln>
+    </cs:spPr>
+  </cs:dataPointMarker>
+  <cs:dataPointMarkerLayout symbol="circle" size="6"/>
+  <cs:dataPointWireframe>
+    <cs:lnRef idx="0">
+      <cs:styleClr val="auto"/>
+    </cs:lnRef>
+    <cs:fillRef idx="3"/>
+    <cs:effectRef idx="3"/>
+    <cs:fontRef idx="minor">
+      <a:schemeClr val="tx1"/>
+    </cs:fontRef>
+    <cs:spPr>
+      <a:ln w="9525" cap="rnd">
+        <a:solidFill>
+          <a:schemeClr val="phClr"/>
+        </a:solidFill>
+        <a:round/>
+      </a:ln>
+    </cs:spPr>
+  </cs:dataPointWireframe>
+  <cs:dataTable>
+    <cs:lnRef idx="0"/>
+    <cs:fillRef idx="0"/>
+    <cs:effectRef idx="0"/>
+    <cs:fontRef idx="minor">
+      <a:schemeClr val="lt1">
+        <a:lumMod val="75000"/>
+      </a:schemeClr>
+    </cs:fontRef>
+    <cs:spPr>
+      <a:ln w="9525">
+        <a:solidFill>
+          <a:schemeClr val="lt1">
+            <a:lumMod val="95000"/>
+            <a:alpha val="54000"/>
+          </a:schemeClr>
+        </a:solidFill>
+      </a:ln>
+    </cs:spPr>
+    <cs:defRPr sz="900" kern="1200"/>
+  </cs:dataTable>
+  <cs:downBar>
+    <cs:lnRef idx="0"/>
+    <cs:fillRef idx="0"/>
+    <cs:effectRef idx="0"/>
+    <cs:fontRef idx="minor">
+      <a:schemeClr val="tx1"/>
+    </cs:fontRef>
+    <cs:spPr>
+      <a:solidFill>
+        <a:schemeClr val="dk1">
+          <a:lumMod val="75000"/>
+          <a:lumOff val="25000"/>
+        </a:schemeClr>
+      </a:solidFill>
+      <a:ln w="9525">
+        <a:solidFill>
+          <a:schemeClr val="lt1">
+            <a:lumMod val="95000"/>
+            <a:alpha val="54000"/>
+          </a:schemeClr>
+        </a:solidFill>
+      </a:ln>
+    </cs:spPr>
+  </cs:downBar>
+  <cs:dropLine>
+    <cs:lnRef idx="0"/>
+    <cs:fillRef idx="0"/>
+    <cs:effectRef idx="0"/>
+    <cs:fontRef idx="minor">
+      <a:schemeClr val="tx1"/>
+    </cs:fontRef>
+    <cs:spPr>
+      <a:ln w="9525">
+        <a:solidFill>
+          <a:schemeClr val="lt1">
+            <a:lumMod val="95000"/>
+            <a:alpha val="54000"/>
+          </a:schemeClr>
+        </a:solidFill>
+        <a:prstDash val="dash"/>
+      </a:ln>
+    </cs:spPr>
+  </cs:dropLine>
+  <cs:errorBar>
+    <cs:lnRef idx="0"/>
+    <cs:fillRef idx="0"/>
+    <cs:effectRef idx="0"/>
+    <cs:fontRef idx="minor">
+      <a:schemeClr val="tx1"/>
+    </cs:fontRef>
+    <cs:spPr>
+      <a:ln w="9525" cap="flat" cmpd="sng" algn="ctr">
+        <a:solidFill>
+          <a:schemeClr val="lt1">
+            <a:lumMod val="95000"/>
+          </a:schemeClr>
+        </a:solidFill>
+        <a:round/>
+      </a:ln>
+    </cs:spPr>
+  </cs:errorBar>
+  <cs:floor>
+    <cs:lnRef idx="0"/>
+    <cs:fillRef idx="0"/>
+    <cs:effectRef idx="0"/>
+    <cs:fontRef idx="minor">
+      <a:schemeClr val="tx1"/>
+    </cs:fontRef>
+  </cs:floor>
+  <cs:gridlineMajor>
+    <cs:lnRef idx="0"/>
+    <cs:fillRef idx="0"/>
+    <cs:effectRef idx="0"/>
+    <cs:fontRef idx="minor">
+      <a:schemeClr val="tx1"/>
+    </cs:fontRef>
+    <cs:spPr>
+      <a:ln w="9525" cap="flat" cmpd="sng" algn="ctr">
+        <a:solidFill>
+          <a:schemeClr val="lt1">
+            <a:lumMod val="95000"/>
+            <a:alpha val="10000"/>
+          </a:schemeClr>
+        </a:solidFill>
+        <a:round/>
+      </a:ln>
+    </cs:spPr>
+  </cs:gridlineMajor>
+  <cs:gridlineMinor>
+    <cs:lnRef idx="0"/>
+    <cs:fillRef idx="0"/>
+    <cs:effectRef idx="0"/>
+    <cs:fontRef idx="minor">
+      <a:schemeClr val="tx1"/>
+    </cs:fontRef>
+    <cs:spPr>
+      <a:ln>
+        <a:solidFill>
+          <a:schemeClr val="lt1">
+            <a:lumMod val="95000"/>
+            <a:alpha val="5000"/>
+          </a:schemeClr>
+        </a:solidFill>
+      </a:ln>
+    </cs:spPr>
+  </cs:gridlineMinor>
+  <cs:hiLoLine>
+    <cs:lnRef idx="0"/>
+    <cs:fillRef idx="0"/>
+    <cs:effectRef idx="0"/>
+    <cs:fontRef idx="minor">
+      <a:schemeClr val="tx1"/>
+    </cs:fontRef>
+    <cs:spPr>
+      <a:ln w="9525">
+        <a:solidFill>
+          <a:schemeClr val="lt1">
+            <a:lumMod val="95000"/>
+            <a:alpha val="54000"/>
+          </a:schemeClr>
+        </a:solidFill>
+        <a:prstDash val="dash"/>
+      </a:ln>
+    </cs:spPr>
+  </cs:hiLoLine>
+  <cs:leaderLine>
+    <cs:lnRef idx="0"/>
+    <cs:fillRef idx="0"/>
+    <cs:effectRef idx="0"/>
+    <cs:fontRef idx="minor">
+      <a:schemeClr val="tx1"/>
+    </cs:fontRef>
+    <cs:spPr>
+      <a:ln w="9525">
+        <a:solidFill>
+          <a:schemeClr val="lt1">
+            <a:lumMod val="95000"/>
+            <a:alpha val="54000"/>
+          </a:schemeClr>
+        </a:solidFill>
+      </a:ln>
+    </cs:spPr>
+  </cs:leaderLine>
+  <cs:legend>
+    <cs:lnRef idx="0"/>
+    <cs:fillRef idx="0"/>
+    <cs:effectRef idx="0"/>
+    <cs:fontRef idx="minor">
+      <a:schemeClr val="lt1">
+        <a:lumMod val="75000"/>
+      </a:schemeClr>
+    </cs:fontRef>
+    <cs:defRPr sz="900" kern="1200"/>
+  </cs:legend>
+  <cs:plotArea>
+    <cs:lnRef idx="0"/>
+    <cs:fillRef idx="0"/>
+    <cs:effectRef idx="0"/>
+    <cs:fontRef idx="minor">
+      <a:schemeClr val="tx1"/>
+    </cs:fontRef>
+  </cs:plotArea>
+  <cs:plotArea3D>
+    <cs:lnRef idx="0"/>
+    <cs:fillRef idx="0"/>
+    <cs:effectRef idx="0"/>
+    <cs:fontRef idx="minor">
+      <a:schemeClr val="tx1"/>
+    </cs:fontRef>
+  </cs:plotArea3D>
+  <cs:seriesAxis>
+    <cs:lnRef idx="0"/>
+    <cs:fillRef idx="0"/>
+    <cs:effectRef idx="0"/>
+    <cs:fontRef idx="minor">
+      <a:schemeClr val="lt1">
+        <a:lumMod val="75000"/>
+      </a:schemeClr>
+    </cs:fontRef>
+    <cs:spPr>
+      <a:ln w="9525" cap="flat" cmpd="sng" algn="ctr">
+        <a:solidFill>
+          <a:schemeClr val="lt1">
+            <a:lumMod val="50000"/>
+          </a:schemeClr>
+        </a:solidFill>
+      </a:ln>
+    </cs:spPr>
+    <cs:defRPr sz="900" kern="1200"/>
+  </cs:seriesAxis>
+  <cs:seriesLine>
+    <cs:lnRef idx="0"/>
+    <cs:fillRef idx="0"/>
+    <cs:effectRef idx="0"/>
+    <cs:fontRef idx="minor">
+      <a:schemeClr val="lt1"/>
+    </cs:fontRef>
+    <cs:spPr>
+      <a:ln w="9525" cap="flat" cmpd="sng" algn="ctr">
+        <a:solidFill>
+          <a:schemeClr val="lt1">
+            <a:lumMod val="95000"/>
+            <a:alpha val="54000"/>
+          </a:schemeClr>
+        </a:solidFill>
+        <a:round/>
+      </a:ln>
+    </cs:spPr>
+  </cs:seriesLine>
+  <cs:title>
+    <cs:lnRef idx="0"/>
+    <cs:fillRef idx="0"/>
+    <cs:effectRef idx="0"/>
+    <cs:fontRef idx="minor">
+      <a:schemeClr val="lt1">
+        <a:lumMod val="95000"/>
+      </a:schemeClr>
+    </cs:fontRef>
+    <cs:defRPr sz="1600" b="1" kern="1200" spc="100" baseline="0">
+      <a:effectLst>
+        <a:outerShdw blurRad="50800" dist="38100" dir="5400000" algn="t" rotWithShape="0">
+          <a:prstClr val="black">
+            <a:alpha val="40000"/>
+          </a:prstClr>
+        </a:outerShdw>
+      </a:effectLst>
+    </cs:defRPr>
+  </cs:title>
+  <cs:trendline>
+    <cs:lnRef idx="0">
+      <cs:styleClr val="auto"/>
+    </cs:lnRef>
+    <cs:fillRef idx="0"/>
+    <cs:effectRef idx="0"/>
+    <cs:fontRef idx="minor">
+      <a:schemeClr val="tx1"/>
+    </cs:fontRef>
+    <cs:spPr>
+      <a:ln w="19050" cap="rnd">
+        <a:solidFill>
+          <a:schemeClr val="phClr"/>
+        </a:solidFill>
+        <a:prstDash val="sysDash"/>
+      </a:ln>
+    </cs:spPr>
+  </cs:trendline>
+  <cs:trendlineLabel>
+    <cs:lnRef idx="0"/>
+    <cs:fillRef idx="0"/>
+    <cs:effectRef idx="0"/>
+    <cs:fontRef idx="minor">
+      <a:schemeClr val="lt1">
+        <a:lumMod val="75000"/>
+      </a:schemeClr>
+    </cs:fontRef>
+    <cs:defRPr sz="900" kern="1200"/>
+  </cs:trendlineLabel>
+  <cs:upBar>
+    <cs:lnRef idx="0"/>
+    <cs:fillRef idx="0"/>
+    <cs:effectRef idx="0"/>
+    <cs:fontRef idx="minor">
+      <a:schemeClr val="tx1"/>
+    </cs:fontRef>
+    <cs:spPr>
+      <a:solidFill>
+        <a:schemeClr val="lt1"/>
+      </a:solidFill>
+      <a:ln w="9525">
+        <a:solidFill>
+          <a:schemeClr val="lt1">
+            <a:lumMod val="95000"/>
+            <a:alpha val="54000"/>
+          </a:schemeClr>
+        </a:solidFill>
+      </a:ln>
+    </cs:spPr>
+  </cs:upBar>
+  <cs:valueAxis>
+    <cs:lnRef idx="0"/>
+    <cs:fillRef idx="0"/>
+    <cs:effectRef idx="0"/>
+    <cs:fontRef idx="minor">
+      <a:schemeClr val="lt1">
+        <a:lumMod val="75000"/>
+      </a:schemeClr>
+    </cs:fontRef>
+    <cs:spPr>
+      <a:ln w="9525" cap="flat" cmpd="sng" algn="ctr">
+        <a:solidFill>
+          <a:schemeClr val="lt1">
+            <a:lumMod val="50000"/>
+          </a:schemeClr>
+        </a:solidFill>
+      </a:ln>
+    </cs:spPr>
+    <cs:defRPr sz="900" kern="1200"/>
+  </cs:valueAxis>
+  <cs:wall>
+    <cs:lnRef idx="0"/>
+    <cs:fillRef idx="0"/>
+    <cs:effectRef idx="0"/>
+    <cs:fontRef idx="minor">
+      <a:schemeClr val="tx1"/>
+    </cs:fontRef>
+  </cs:wall>
+</cs:chartStyle>
+</file>
+
+<file path=ppt/charts/style2.xml><?xml version="1.0" encoding="utf-8"?>
 <cs:chartStyle xmlns:cs="http://schemas.microsoft.com/office/drawing/2012/chartStyle" xmlns:a="http://schemas.openxmlformats.org/drawingml/2006/main" id="248">
   <cs:axisTitle>
     <cs:lnRef idx="0"/>
@@ -11545,6 +14225,132 @@
           <a:lstStyle/>
           <a:p>
             <a:r>
+              <a:rPr lang="hu-HU" dirty="0" err="1" smtClean="0"/>
+              <a:t>OpenCV</a:t>
+            </a:r>
+            <a:r>
+              <a:rPr lang="hu-HU" dirty="0" smtClean="0"/>
+              <a:t> vs. Python</a:t>
+            </a:r>
+            <a:endParaRPr lang="hu-HU" dirty="0"/>
+          </a:p>
+        </p:txBody>
+      </p:sp>
+      <p:sp>
+        <p:nvSpPr>
+          <p:cNvPr id="3" name="Tartalom helye 2"/>
+          <p:cNvSpPr>
+            <a:spLocks noGrp="1"/>
+          </p:cNvSpPr>
+          <p:nvPr>
+            <p:ph idx="1"/>
+          </p:nvPr>
+        </p:nvSpPr>
+        <p:spPr>
+          <a:xfrm>
+            <a:off x="8462682" y="2734235"/>
+            <a:ext cx="2891118" cy="3442728"/>
+          </a:xfrm>
+        </p:spPr>
+        <p:txBody>
+          <a:bodyPr>
+            <a:normAutofit/>
+          </a:bodyPr>
+          <a:lstStyle/>
+          <a:p>
+            <a:pPr marL="0" indent="0" algn="ctr">
+              <a:buNone/>
+            </a:pPr>
+            <a:r>
+              <a:rPr lang="hu-HU" sz="2000" dirty="0" err="1" smtClean="0"/>
+              <a:t>OpenCV</a:t>
+            </a:r>
+            <a:r>
+              <a:rPr lang="hu-HU" sz="2000" dirty="0" smtClean="0"/>
+              <a:t> MOG() futási idő osztva a Python-</a:t>
+            </a:r>
+            <a:r>
+              <a:rPr lang="hu-HU" sz="2000" dirty="0" err="1" smtClean="0"/>
+              <a:t>os</a:t>
+            </a:r>
+            <a:r>
+              <a:rPr lang="hu-HU" sz="2000" dirty="0" smtClean="0"/>
+              <a:t> megvalósítás futási idejével</a:t>
+            </a:r>
+            <a:endParaRPr lang="hu-HU" sz="2000" dirty="0"/>
+          </a:p>
+        </p:txBody>
+      </p:sp>
+      <p:graphicFrame>
+        <p:nvGraphicFramePr>
+          <p:cNvPr id="4" name="Diagram 3"/>
+          <p:cNvGraphicFramePr>
+            <a:graphicFrameLocks/>
+          </p:cNvGraphicFramePr>
+          <p:nvPr>
+            <p:extLst>
+              <p:ext uri="{D42A27DB-BD31-4B8C-83A1-F6EECF244321}">
+                <p14:modId xmlns:p14="http://schemas.microsoft.com/office/powerpoint/2010/main" val="2659033243"/>
+              </p:ext>
+            </p:extLst>
+          </p:nvPr>
+        </p:nvGraphicFramePr>
+        <p:xfrm>
+          <a:off x="304801" y="1894263"/>
+          <a:ext cx="8157881" cy="4324349"/>
+        </p:xfrm>
+        <a:graphic>
+          <a:graphicData uri="http://schemas.openxmlformats.org/drawingml/2006/chart">
+            <c:chart xmlns:c="http://schemas.openxmlformats.org/drawingml/2006/chart" xmlns:r="http://schemas.openxmlformats.org/officeDocument/2006/relationships" r:id="rId2"/>
+          </a:graphicData>
+        </a:graphic>
+      </p:graphicFrame>
+    </p:spTree>
+    <p:extLst>
+      <p:ext uri="{BB962C8B-B14F-4D97-AF65-F5344CB8AC3E}">
+        <p14:creationId xmlns:p14="http://schemas.microsoft.com/office/powerpoint/2010/main" val="3693823625"/>
+      </p:ext>
+    </p:extLst>
+  </p:cSld>
+  <p:clrMapOvr>
+    <a:masterClrMapping/>
+  </p:clrMapOvr>
+</p:sld>
+</file>
+
+<file path=ppt/slides/slide11.xml><?xml version="1.0" encoding="utf-8"?>
+<p:sld xmlns:a="http://schemas.openxmlformats.org/drawingml/2006/main" xmlns:r="http://schemas.openxmlformats.org/officeDocument/2006/relationships" xmlns:p="http://schemas.openxmlformats.org/presentationml/2006/main">
+  <p:cSld>
+    <p:spTree>
+      <p:nvGrpSpPr>
+        <p:cNvPr id="1" name=""/>
+        <p:cNvGrpSpPr/>
+        <p:nvPr/>
+      </p:nvGrpSpPr>
+      <p:grpSpPr>
+        <a:xfrm>
+          <a:off x="0" y="0"/>
+          <a:ext cx="0" cy="0"/>
+          <a:chOff x="0" y="0"/>
+          <a:chExt cx="0" cy="0"/>
+        </a:xfrm>
+      </p:grpSpPr>
+      <p:sp>
+        <p:nvSpPr>
+          <p:cNvPr id="2" name="Cím 1"/>
+          <p:cNvSpPr>
+            <a:spLocks noGrp="1"/>
+          </p:cNvSpPr>
+          <p:nvPr>
+            <p:ph type="title"/>
+          </p:nvPr>
+        </p:nvSpPr>
+        <p:spPr/>
+        <p:txBody>
+          <a:bodyPr/>
+          <a:lstStyle/>
+          <a:p>
+            <a:r>
               <a:rPr lang="hu-HU" dirty="0" smtClean="0"/>
               <a:t>További tervek</a:t>
             </a:r>
@@ -11598,7 +14404,7 @@
 </p:sld>
 </file>
 
-<file path=ppt/slides/slide11.xml><?xml version="1.0" encoding="utf-8"?>
+<file path=ppt/slides/slide12.xml><?xml version="1.0" encoding="utf-8"?>
 <p:sld xmlns:a="http://schemas.openxmlformats.org/drawingml/2006/main" xmlns:r="http://schemas.openxmlformats.org/officeDocument/2006/relationships" xmlns:p="http://schemas.openxmlformats.org/presentationml/2006/main">
   <p:cSld>
     <p:spTree>
@@ -12397,8 +15203,8 @@
         </p:blipFill>
         <p:spPr>
           <a:xfrm>
-            <a:off x="5196821" y="3816723"/>
-            <a:ext cx="6049403" cy="1768287"/>
+            <a:off x="4100415" y="3496235"/>
+            <a:ext cx="7145809" cy="2088775"/>
           </a:xfrm>
           <a:prstGeom prst="rect">
             <a:avLst/>
@@ -12572,61 +15378,6 @@
           <a:chExt cx="0" cy="0"/>
         </a:xfrm>
       </p:grpSpPr>
-      <p:graphicFrame>
-        <p:nvGraphicFramePr>
-          <p:cNvPr id="4" name="Tartalom helye 3"/>
-          <p:cNvGraphicFramePr>
-            <a:graphicFrameLocks noGrp="1"/>
-          </p:cNvGraphicFramePr>
-          <p:nvPr>
-            <p:ph idx="1"/>
-            <p:extLst>
-              <p:ext uri="{D42A27DB-BD31-4B8C-83A1-F6EECF244321}">
-                <p14:modId xmlns:p14="http://schemas.microsoft.com/office/powerpoint/2010/main" val="2099089702"/>
-              </p:ext>
-            </p:extLst>
-          </p:nvPr>
-        </p:nvGraphicFramePr>
-        <p:xfrm>
-          <a:off x="591671" y="295834"/>
-          <a:ext cx="11089341" cy="6149789"/>
-        </p:xfrm>
-        <a:graphic>
-          <a:graphicData uri="http://schemas.openxmlformats.org/drawingml/2006/chart">
-            <c:chart xmlns:c="http://schemas.openxmlformats.org/drawingml/2006/chart" xmlns:r="http://schemas.openxmlformats.org/officeDocument/2006/relationships" r:id="rId2"/>
-          </a:graphicData>
-        </a:graphic>
-      </p:graphicFrame>
-    </p:spTree>
-    <p:extLst>
-      <p:ext uri="{BB962C8B-B14F-4D97-AF65-F5344CB8AC3E}">
-        <p14:creationId xmlns:p14="http://schemas.microsoft.com/office/powerpoint/2010/main" val="3056832702"/>
-      </p:ext>
-    </p:extLst>
-  </p:cSld>
-  <p:clrMapOvr>
-    <a:masterClrMapping/>
-  </p:clrMapOvr>
-</p:sld>
-</file>
-
-<file path=ppt/slides/slide9.xml><?xml version="1.0" encoding="utf-8"?>
-<p:sld xmlns:a="http://schemas.openxmlformats.org/drawingml/2006/main" xmlns:r="http://schemas.openxmlformats.org/officeDocument/2006/relationships" xmlns:p="http://schemas.openxmlformats.org/presentationml/2006/main">
-  <p:cSld>
-    <p:spTree>
-      <p:nvGrpSpPr>
-        <p:cNvPr id="1" name=""/>
-        <p:cNvGrpSpPr/>
-        <p:nvPr/>
-      </p:nvGrpSpPr>
-      <p:grpSpPr>
-        <a:xfrm>
-          <a:off x="0" y="0"/>
-          <a:ext cx="0" cy="0"/>
-          <a:chOff x="0" y="0"/>
-          <a:chExt cx="0" cy="0"/>
-        </a:xfrm>
-      </p:grpSpPr>
       <p:sp>
         <p:nvSpPr>
           <p:cNvPr id="2" name="Cím 1"/>
@@ -12685,6 +15436,118 @@
     <p:extLst>
       <p:ext uri="{BB962C8B-B14F-4D97-AF65-F5344CB8AC3E}">
         <p14:creationId xmlns:p14="http://schemas.microsoft.com/office/powerpoint/2010/main" val="4078088953"/>
+      </p:ext>
+    </p:extLst>
+  </p:cSld>
+  <p:clrMapOvr>
+    <a:masterClrMapping/>
+  </p:clrMapOvr>
+</p:sld>
+</file>
+
+<file path=ppt/slides/slide9.xml><?xml version="1.0" encoding="utf-8"?>
+<p:sld xmlns:a="http://schemas.openxmlformats.org/drawingml/2006/main" xmlns:r="http://schemas.openxmlformats.org/officeDocument/2006/relationships" xmlns:p="http://schemas.openxmlformats.org/presentationml/2006/main">
+  <p:cSld>
+    <p:spTree>
+      <p:nvGrpSpPr>
+        <p:cNvPr id="1" name=""/>
+        <p:cNvGrpSpPr/>
+        <p:nvPr/>
+      </p:nvGrpSpPr>
+      <p:grpSpPr>
+        <a:xfrm>
+          <a:off x="0" y="0"/>
+          <a:ext cx="0" cy="0"/>
+          <a:chOff x="0" y="0"/>
+          <a:chExt cx="0" cy="0"/>
+        </a:xfrm>
+      </p:grpSpPr>
+      <p:graphicFrame>
+        <p:nvGraphicFramePr>
+          <p:cNvPr id="4" name="Tartalom helye 3"/>
+          <p:cNvGraphicFramePr>
+            <a:graphicFrameLocks noGrp="1"/>
+          </p:cNvGraphicFramePr>
+          <p:nvPr>
+            <p:ph idx="1"/>
+            <p:extLst>
+              <p:ext uri="{D42A27DB-BD31-4B8C-83A1-F6EECF244321}">
+                <p14:modId xmlns:p14="http://schemas.microsoft.com/office/powerpoint/2010/main" val="570752879"/>
+              </p:ext>
+            </p:extLst>
+          </p:nvPr>
+        </p:nvGraphicFramePr>
+        <p:xfrm>
+          <a:off x="591671" y="295834"/>
+          <a:ext cx="8202705" cy="6149789"/>
+        </p:xfrm>
+        <a:graphic>
+          <a:graphicData uri="http://schemas.openxmlformats.org/drawingml/2006/chart">
+            <c:chart xmlns:c="http://schemas.openxmlformats.org/drawingml/2006/chart" xmlns:r="http://schemas.openxmlformats.org/officeDocument/2006/relationships" r:id="rId2"/>
+          </a:graphicData>
+        </a:graphic>
+      </p:graphicFrame>
+      <p:sp>
+        <p:nvSpPr>
+          <p:cNvPr id="6" name="Szövegdoboz 5"/>
+          <p:cNvSpPr txBox="1"/>
+          <p:nvPr/>
+        </p:nvSpPr>
+        <p:spPr>
+          <a:xfrm>
+            <a:off x="8937812" y="1380565"/>
+            <a:ext cx="2572871" cy="1477328"/>
+          </a:xfrm>
+          <a:prstGeom prst="rect">
+            <a:avLst/>
+          </a:prstGeom>
+          <a:noFill/>
+        </p:spPr>
+        <p:txBody>
+          <a:bodyPr wrap="square" rtlCol="0">
+            <a:spAutoFit/>
+          </a:bodyPr>
+          <a:lstStyle/>
+          <a:p>
+            <a:pPr marL="285750" indent="-285750">
+              <a:buFont typeface="Arial" panose="020B0604020202020204" pitchFamily="34" charset="0"/>
+              <a:buChar char="•"/>
+            </a:pPr>
+            <a:r>
+              <a:rPr lang="hu-HU" dirty="0" smtClean="0"/>
+              <a:t>5 különböző kép</a:t>
+            </a:r>
+          </a:p>
+          <a:p>
+            <a:pPr marL="285750" indent="-285750">
+              <a:buFont typeface="Arial" panose="020B0604020202020204" pitchFamily="34" charset="0"/>
+              <a:buChar char="•"/>
+            </a:pPr>
+            <a:endParaRPr lang="hu-HU" dirty="0" smtClean="0"/>
+          </a:p>
+          <a:p>
+            <a:pPr marL="285750" indent="-285750">
+              <a:buFont typeface="Arial" panose="020B0604020202020204" pitchFamily="34" charset="0"/>
+              <a:buChar char="•"/>
+            </a:pPr>
+            <a:r>
+              <a:rPr lang="hu-HU" dirty="0" smtClean="0"/>
+              <a:t>60 különböző kép méret</a:t>
+            </a:r>
+          </a:p>
+          <a:p>
+            <a:pPr marL="285750" indent="-285750">
+              <a:buFont typeface="Arial" panose="020B0604020202020204" pitchFamily="34" charset="0"/>
+              <a:buChar char="•"/>
+            </a:pPr>
+            <a:endParaRPr lang="hu-HU" dirty="0" smtClean="0"/>
+          </a:p>
+        </p:txBody>
+      </p:sp>
+    </p:spTree>
+    <p:extLst>
+      <p:ext uri="{BB962C8B-B14F-4D97-AF65-F5344CB8AC3E}">
+        <p14:creationId xmlns:p14="http://schemas.microsoft.com/office/powerpoint/2010/main" val="3056832702"/>
       </p:ext>
     </p:extLst>
   </p:cSld>

</xml_diff>

<commit_message>
/timemeasurement: Auto stash before cherrypick of "v0.1"
</commit_message>
<xml_diff>
--- a/01_doc/presentation.pptx
+++ b/01_doc/presentation.pptx
@@ -13,10 +13,12 @@
     <p:sldId id="258" r:id="rId7"/>
     <p:sldId id="259" r:id="rId8"/>
     <p:sldId id="260" r:id="rId9"/>
-    <p:sldId id="270" r:id="rId10"/>
-    <p:sldId id="271" r:id="rId11"/>
-    <p:sldId id="261" r:id="rId12"/>
-    <p:sldId id="265" r:id="rId13"/>
+    <p:sldId id="273" r:id="rId10"/>
+    <p:sldId id="274" r:id="rId11"/>
+    <p:sldId id="270" r:id="rId12"/>
+    <p:sldId id="271" r:id="rId13"/>
+    <p:sldId id="261" r:id="rId14"/>
+    <p:sldId id="265" r:id="rId15"/>
   </p:sldIdLst>
   <p:sldSz cx="12192000" cy="6858000"/>
   <p:notesSz cx="6858000" cy="9144000"/>
@@ -14225,6 +14227,197 @@
           <a:lstStyle/>
           <a:p>
             <a:r>
+              <a:rPr lang="hu-HU" dirty="0" smtClean="0"/>
+              <a:t>Várható értékek megjelenítése</a:t>
+            </a:r>
+            <a:endParaRPr lang="hu-HU" dirty="0"/>
+          </a:p>
+        </p:txBody>
+      </p:sp>
+      <p:pic>
+        <p:nvPicPr>
+          <p:cNvPr id="6" name="Tartalom helye 5"/>
+          <p:cNvPicPr>
+            <a:picLocks noGrp="1" noChangeAspect="1"/>
+          </p:cNvPicPr>
+          <p:nvPr>
+            <p:ph idx="1"/>
+          </p:nvPr>
+        </p:nvPicPr>
+        <p:blipFill>
+          <a:blip r:embed="rId2"/>
+          <a:stretch>
+            <a:fillRect/>
+          </a:stretch>
+        </p:blipFill>
+        <p:spPr>
+          <a:xfrm>
+            <a:off x="838200" y="2115678"/>
+            <a:ext cx="10515600" cy="3771232"/>
+          </a:xfrm>
+          <a:prstGeom prst="rect">
+            <a:avLst/>
+          </a:prstGeom>
+        </p:spPr>
+      </p:pic>
+    </p:spTree>
+    <p:extLst>
+      <p:ext uri="{BB962C8B-B14F-4D97-AF65-F5344CB8AC3E}">
+        <p14:creationId xmlns:p14="http://schemas.microsoft.com/office/powerpoint/2010/main" val="2392925784"/>
+      </p:ext>
+    </p:extLst>
+  </p:cSld>
+  <p:clrMapOvr>
+    <a:masterClrMapping/>
+  </p:clrMapOvr>
+</p:sld>
+</file>
+
+<file path=ppt/slides/slide11.xml><?xml version="1.0" encoding="utf-8"?>
+<p:sld xmlns:a="http://schemas.openxmlformats.org/drawingml/2006/main" xmlns:r="http://schemas.openxmlformats.org/officeDocument/2006/relationships" xmlns:p="http://schemas.openxmlformats.org/presentationml/2006/main">
+  <p:cSld>
+    <p:spTree>
+      <p:nvGrpSpPr>
+        <p:cNvPr id="1" name=""/>
+        <p:cNvGrpSpPr/>
+        <p:nvPr/>
+      </p:nvGrpSpPr>
+      <p:grpSpPr>
+        <a:xfrm>
+          <a:off x="0" y="0"/>
+          <a:ext cx="0" cy="0"/>
+          <a:chOff x="0" y="0"/>
+          <a:chExt cx="0" cy="0"/>
+        </a:xfrm>
+      </p:grpSpPr>
+      <p:graphicFrame>
+        <p:nvGraphicFramePr>
+          <p:cNvPr id="4" name="Tartalom helye 3"/>
+          <p:cNvGraphicFramePr>
+            <a:graphicFrameLocks noGrp="1"/>
+          </p:cNvGraphicFramePr>
+          <p:nvPr>
+            <p:ph idx="1"/>
+            <p:extLst>
+              <p:ext uri="{D42A27DB-BD31-4B8C-83A1-F6EECF244321}">
+                <p14:modId xmlns:p14="http://schemas.microsoft.com/office/powerpoint/2010/main" val="570752879"/>
+              </p:ext>
+            </p:extLst>
+          </p:nvPr>
+        </p:nvGraphicFramePr>
+        <p:xfrm>
+          <a:off x="591671" y="295834"/>
+          <a:ext cx="8202705" cy="6149789"/>
+        </p:xfrm>
+        <a:graphic>
+          <a:graphicData uri="http://schemas.openxmlformats.org/drawingml/2006/chart">
+            <c:chart xmlns:c="http://schemas.openxmlformats.org/drawingml/2006/chart" xmlns:r="http://schemas.openxmlformats.org/officeDocument/2006/relationships" r:id="rId2"/>
+          </a:graphicData>
+        </a:graphic>
+      </p:graphicFrame>
+      <p:sp>
+        <p:nvSpPr>
+          <p:cNvPr id="6" name="Szövegdoboz 5"/>
+          <p:cNvSpPr txBox="1"/>
+          <p:nvPr/>
+        </p:nvSpPr>
+        <p:spPr>
+          <a:xfrm>
+            <a:off x="8937812" y="1380565"/>
+            <a:ext cx="2572871" cy="1477328"/>
+          </a:xfrm>
+          <a:prstGeom prst="rect">
+            <a:avLst/>
+          </a:prstGeom>
+          <a:noFill/>
+        </p:spPr>
+        <p:txBody>
+          <a:bodyPr wrap="square" rtlCol="0">
+            <a:spAutoFit/>
+          </a:bodyPr>
+          <a:lstStyle/>
+          <a:p>
+            <a:pPr marL="285750" indent="-285750">
+              <a:buFont typeface="Arial" panose="020B0604020202020204" pitchFamily="34" charset="0"/>
+              <a:buChar char="•"/>
+            </a:pPr>
+            <a:r>
+              <a:rPr lang="hu-HU" dirty="0" smtClean="0"/>
+              <a:t>5 különböző kép</a:t>
+            </a:r>
+          </a:p>
+          <a:p>
+            <a:pPr marL="285750" indent="-285750">
+              <a:buFont typeface="Arial" panose="020B0604020202020204" pitchFamily="34" charset="0"/>
+              <a:buChar char="•"/>
+            </a:pPr>
+            <a:endParaRPr lang="hu-HU" dirty="0" smtClean="0"/>
+          </a:p>
+          <a:p>
+            <a:pPr marL="285750" indent="-285750">
+              <a:buFont typeface="Arial" panose="020B0604020202020204" pitchFamily="34" charset="0"/>
+              <a:buChar char="•"/>
+            </a:pPr>
+            <a:r>
+              <a:rPr lang="hu-HU" dirty="0" smtClean="0"/>
+              <a:t>60 különböző kép méret</a:t>
+            </a:r>
+          </a:p>
+          <a:p>
+            <a:pPr marL="285750" indent="-285750">
+              <a:buFont typeface="Arial" panose="020B0604020202020204" pitchFamily="34" charset="0"/>
+              <a:buChar char="•"/>
+            </a:pPr>
+            <a:endParaRPr lang="hu-HU" dirty="0" smtClean="0"/>
+          </a:p>
+        </p:txBody>
+      </p:sp>
+    </p:spTree>
+    <p:extLst>
+      <p:ext uri="{BB962C8B-B14F-4D97-AF65-F5344CB8AC3E}">
+        <p14:creationId xmlns:p14="http://schemas.microsoft.com/office/powerpoint/2010/main" val="3056832702"/>
+      </p:ext>
+    </p:extLst>
+  </p:cSld>
+  <p:clrMapOvr>
+    <a:masterClrMapping/>
+  </p:clrMapOvr>
+</p:sld>
+</file>
+
+<file path=ppt/slides/slide12.xml><?xml version="1.0" encoding="utf-8"?>
+<p:sld xmlns:a="http://schemas.openxmlformats.org/drawingml/2006/main" xmlns:r="http://schemas.openxmlformats.org/officeDocument/2006/relationships" xmlns:p="http://schemas.openxmlformats.org/presentationml/2006/main">
+  <p:cSld>
+    <p:spTree>
+      <p:nvGrpSpPr>
+        <p:cNvPr id="1" name=""/>
+        <p:cNvGrpSpPr/>
+        <p:nvPr/>
+      </p:nvGrpSpPr>
+      <p:grpSpPr>
+        <a:xfrm>
+          <a:off x="0" y="0"/>
+          <a:ext cx="0" cy="0"/>
+          <a:chOff x="0" y="0"/>
+          <a:chExt cx="0" cy="0"/>
+        </a:xfrm>
+      </p:grpSpPr>
+      <p:sp>
+        <p:nvSpPr>
+          <p:cNvPr id="2" name="Cím 1"/>
+          <p:cNvSpPr>
+            <a:spLocks noGrp="1"/>
+          </p:cNvSpPr>
+          <p:nvPr>
+            <p:ph type="title"/>
+          </p:nvPr>
+        </p:nvSpPr>
+        <p:spPr/>
+        <p:txBody>
+          <a:bodyPr/>
+          <a:lstStyle/>
+          <a:p>
+            <a:r>
               <a:rPr lang="hu-HU" dirty="0" err="1" smtClean="0"/>
               <a:t>OpenCV</a:t>
             </a:r>
@@ -14318,7 +14511,7 @@
 </p:sld>
 </file>
 
-<file path=ppt/slides/slide11.xml><?xml version="1.0" encoding="utf-8"?>
+<file path=ppt/slides/slide13.xml><?xml version="1.0" encoding="utf-8"?>
 <p:sld xmlns:a="http://schemas.openxmlformats.org/drawingml/2006/main" xmlns:r="http://schemas.openxmlformats.org/officeDocument/2006/relationships" xmlns:p="http://schemas.openxmlformats.org/presentationml/2006/main">
   <p:cSld>
     <p:spTree>
@@ -14379,13 +14572,58 @@
             </a:r>
           </a:p>
           <a:p>
+            <a:pPr lvl="1"/>
+            <a:r>
+              <a:rPr lang="hu-HU" dirty="0" smtClean="0"/>
+              <a:t>Szálak használata</a:t>
+            </a:r>
+          </a:p>
+          <a:p>
+            <a:pPr lvl="1"/>
+            <a:r>
+              <a:rPr lang="hu-HU" dirty="0" err="1" smtClean="0"/>
+              <a:t>Processzek</a:t>
+            </a:r>
+            <a:r>
+              <a:rPr lang="hu-HU" dirty="0" smtClean="0"/>
+              <a:t> használata</a:t>
+            </a:r>
+          </a:p>
+          <a:p>
+            <a:endParaRPr lang="hu-HU" dirty="0"/>
+          </a:p>
+          <a:p>
             <a:r>
               <a:rPr lang="hu-HU" dirty="0" smtClean="0"/>
               <a:t>Neurális </a:t>
             </a:r>
             <a:r>
               <a:rPr lang="hu-HU" dirty="0" smtClean="0"/>
-              <a:t>háló az apertúra problémára</a:t>
+              <a:t>háló az apertúra </a:t>
+            </a:r>
+            <a:r>
+              <a:rPr lang="hu-HU" dirty="0" smtClean="0"/>
+              <a:t>problémára</a:t>
+            </a:r>
+            <a:endParaRPr lang="hu-HU" dirty="0"/>
+          </a:p>
+          <a:p>
+            <a:pPr lvl="1"/>
+            <a:r>
+              <a:rPr lang="hu-HU" dirty="0" err="1" smtClean="0"/>
+              <a:t>Autoencoder</a:t>
+            </a:r>
+            <a:endParaRPr lang="hu-HU" dirty="0" smtClean="0"/>
+          </a:p>
+          <a:p>
+            <a:pPr lvl="1"/>
+            <a:r>
+              <a:rPr lang="hu-HU" dirty="0" err="1" smtClean="0"/>
+              <a:t>Konvolúciós</a:t>
+            </a:r>
+            <a:r>
+              <a:rPr lang="hu-HU" dirty="0" smtClean="0"/>
+              <a:t> háló</a:t>
             </a:r>
             <a:endParaRPr lang="hu-HU" dirty="0"/>
           </a:p>
@@ -14404,7 +14642,7 @@
 </p:sld>
 </file>
 
-<file path=ppt/slides/slide12.xml><?xml version="1.0" encoding="utf-8"?>
+<file path=ppt/slides/slide14.xml><?xml version="1.0" encoding="utf-8"?>
 <p:sld xmlns:a="http://schemas.openxmlformats.org/drawingml/2006/main" xmlns:r="http://schemas.openxmlformats.org/officeDocument/2006/relationships" xmlns:p="http://schemas.openxmlformats.org/presentationml/2006/main">
   <p:cSld>
     <p:spTree>
@@ -15288,6 +15526,9 @@
             </a:r>
           </a:p>
           <a:p>
+            <a:endParaRPr lang="hu-HU" dirty="0" smtClean="0"/>
+          </a:p>
+          <a:p>
             <a:r>
               <a:rPr lang="hu-HU" dirty="0" err="1" smtClean="0"/>
               <a:t>np.einsum</a:t>
@@ -15395,43 +15636,38 @@
           <a:p>
             <a:r>
               <a:rPr lang="hu-HU" dirty="0" smtClean="0"/>
-              <a:t>Elért eredmények</a:t>
+              <a:t>Várható értékek megjelenítése</a:t>
             </a:r>
             <a:endParaRPr lang="hu-HU" dirty="0"/>
           </a:p>
         </p:txBody>
       </p:sp>
-      <p:sp>
-        <p:nvSpPr>
-          <p:cNvPr id="3" name="Tartalom helye 2"/>
-          <p:cNvSpPr>
-            <a:spLocks noGrp="1"/>
-          </p:cNvSpPr>
+      <p:pic>
+        <p:nvPicPr>
+          <p:cNvPr id="5" name="Tartalom helye 4"/>
+          <p:cNvPicPr>
+            <a:picLocks noGrp="1" noChangeAspect="1"/>
+          </p:cNvPicPr>
           <p:nvPr>
             <p:ph idx="1"/>
           </p:nvPr>
-        </p:nvSpPr>
-        <p:spPr/>
-        <p:txBody>
-          <a:bodyPr/>
-          <a:lstStyle/>
-          <a:p>
-            <a:r>
-              <a:rPr lang="hu-HU" dirty="0" smtClean="0"/>
-              <a:t>Teszt képek összehasonlítva </a:t>
-            </a:r>
-            <a:r>
-              <a:rPr lang="hu-HU" dirty="0" err="1" smtClean="0"/>
-              <a:t>openCV</a:t>
-            </a:r>
-            <a:r>
-              <a:rPr lang="hu-HU" dirty="0" smtClean="0"/>
-              <a:t> MOG algoritmussal</a:t>
-            </a:r>
-            <a:endParaRPr lang="hu-HU" dirty="0"/>
-          </a:p>
-        </p:txBody>
-      </p:sp>
+        </p:nvPicPr>
+        <p:blipFill>
+          <a:blip r:embed="rId2"/>
+          <a:stretch>
+            <a:fillRect/>
+          </a:stretch>
+        </p:blipFill>
+        <p:spPr>
+          <a:xfrm>
+            <a:off x="838200" y="2101674"/>
+            <a:ext cx="10515600" cy="3799240"/>
+          </a:xfrm>
+          <a:prstGeom prst="rect">
+            <a:avLst/>
+          </a:prstGeom>
+        </p:spPr>
+      </p:pic>
     </p:spTree>
     <p:extLst>
       <p:ext uri="{BB962C8B-B14F-4D97-AF65-F5344CB8AC3E}">
@@ -15462,92 +15698,59 @@
           <a:chExt cx="0" cy="0"/>
         </a:xfrm>
       </p:grpSpPr>
-      <p:graphicFrame>
-        <p:nvGraphicFramePr>
+      <p:sp>
+        <p:nvSpPr>
+          <p:cNvPr id="2" name="Cím 1"/>
+          <p:cNvSpPr>
+            <a:spLocks noGrp="1"/>
+          </p:cNvSpPr>
+          <p:nvPr>
+            <p:ph type="title"/>
+          </p:nvPr>
+        </p:nvSpPr>
+        <p:spPr/>
+        <p:txBody>
+          <a:bodyPr/>
+          <a:lstStyle/>
+          <a:p>
+            <a:r>
+              <a:rPr lang="hu-HU" dirty="0" smtClean="0"/>
+              <a:t>Várható értékek megjelenítése</a:t>
+            </a:r>
+            <a:endParaRPr lang="hu-HU" dirty="0"/>
+          </a:p>
+        </p:txBody>
+      </p:sp>
+      <p:pic>
+        <p:nvPicPr>
           <p:cNvPr id="4" name="Tartalom helye 3"/>
-          <p:cNvGraphicFramePr>
-            <a:graphicFrameLocks noGrp="1"/>
-          </p:cNvGraphicFramePr>
+          <p:cNvPicPr>
+            <a:picLocks noGrp="1" noChangeAspect="1"/>
+          </p:cNvPicPr>
           <p:nvPr>
             <p:ph idx="1"/>
-            <p:extLst>
-              <p:ext uri="{D42A27DB-BD31-4B8C-83A1-F6EECF244321}">
-                <p14:modId xmlns:p14="http://schemas.microsoft.com/office/powerpoint/2010/main" val="570752879"/>
-              </p:ext>
-            </p:extLst>
           </p:nvPr>
-        </p:nvGraphicFramePr>
-        <p:xfrm>
-          <a:off x="591671" y="295834"/>
-          <a:ext cx="8202705" cy="6149789"/>
-        </p:xfrm>
-        <a:graphic>
-          <a:graphicData uri="http://schemas.openxmlformats.org/drawingml/2006/chart">
-            <c:chart xmlns:c="http://schemas.openxmlformats.org/drawingml/2006/chart" xmlns:r="http://schemas.openxmlformats.org/officeDocument/2006/relationships" r:id="rId2"/>
-          </a:graphicData>
-        </a:graphic>
-      </p:graphicFrame>
-      <p:sp>
-        <p:nvSpPr>
-          <p:cNvPr id="6" name="Szövegdoboz 5"/>
-          <p:cNvSpPr txBox="1"/>
-          <p:nvPr/>
-        </p:nvSpPr>
+        </p:nvPicPr>
+        <p:blipFill>
+          <a:blip r:embed="rId2"/>
+          <a:stretch>
+            <a:fillRect/>
+          </a:stretch>
+        </p:blipFill>
         <p:spPr>
           <a:xfrm>
-            <a:off x="8937812" y="1380565"/>
-            <a:ext cx="2572871" cy="1477328"/>
+            <a:off x="838200" y="2113766"/>
+            <a:ext cx="10515600" cy="3775056"/>
           </a:xfrm>
           <a:prstGeom prst="rect">
             <a:avLst/>
           </a:prstGeom>
-          <a:noFill/>
         </p:spPr>
-        <p:txBody>
-          <a:bodyPr wrap="square" rtlCol="0">
-            <a:spAutoFit/>
-          </a:bodyPr>
-          <a:lstStyle/>
-          <a:p>
-            <a:pPr marL="285750" indent="-285750">
-              <a:buFont typeface="Arial" panose="020B0604020202020204" pitchFamily="34" charset="0"/>
-              <a:buChar char="•"/>
-            </a:pPr>
-            <a:r>
-              <a:rPr lang="hu-HU" dirty="0" smtClean="0"/>
-              <a:t>5 különböző kép</a:t>
-            </a:r>
-          </a:p>
-          <a:p>
-            <a:pPr marL="285750" indent="-285750">
-              <a:buFont typeface="Arial" panose="020B0604020202020204" pitchFamily="34" charset="0"/>
-              <a:buChar char="•"/>
-            </a:pPr>
-            <a:endParaRPr lang="hu-HU" dirty="0" smtClean="0"/>
-          </a:p>
-          <a:p>
-            <a:pPr marL="285750" indent="-285750">
-              <a:buFont typeface="Arial" panose="020B0604020202020204" pitchFamily="34" charset="0"/>
-              <a:buChar char="•"/>
-            </a:pPr>
-            <a:r>
-              <a:rPr lang="hu-HU" dirty="0" smtClean="0"/>
-              <a:t>60 különböző kép méret</a:t>
-            </a:r>
-          </a:p>
-          <a:p>
-            <a:pPr marL="285750" indent="-285750">
-              <a:buFont typeface="Arial" panose="020B0604020202020204" pitchFamily="34" charset="0"/>
-              <a:buChar char="•"/>
-            </a:pPr>
-            <a:endParaRPr lang="hu-HU" dirty="0" smtClean="0"/>
-          </a:p>
-        </p:txBody>
-      </p:sp>
+      </p:pic>
     </p:spTree>
     <p:extLst>
       <p:ext uri="{BB962C8B-B14F-4D97-AF65-F5344CB8AC3E}">
-        <p14:creationId xmlns:p14="http://schemas.microsoft.com/office/powerpoint/2010/main" val="3056832702"/>
+        <p14:creationId xmlns:p14="http://schemas.microsoft.com/office/powerpoint/2010/main" val="920575833"/>
       </p:ext>
     </p:extLst>
   </p:cSld>

</xml_diff>